<commit_message>
Atualização do código e da apresentação
</commit_message>
<xml_diff>
--- a/DataScience.pptx
+++ b/DataScience.pptx
@@ -5,7 +5,7 @@
     <p:sldMasterId id="2147483648" r:id="rId4"/>
   </p:sldMasterIdLst>
   <p:notesMasterIdLst>
-    <p:notesMasterId r:id="rId21"/>
+    <p:notesMasterId r:id="rId23"/>
   </p:notesMasterIdLst>
   <p:sldIdLst>
     <p:sldId id="257" r:id="rId5"/>
@@ -17,13 +17,15 @@
     <p:sldId id="263" r:id="rId11"/>
     <p:sldId id="264" r:id="rId12"/>
     <p:sldId id="267" r:id="rId13"/>
-    <p:sldId id="268" r:id="rId14"/>
-    <p:sldId id="269" r:id="rId15"/>
-    <p:sldId id="270" r:id="rId16"/>
-    <p:sldId id="271" r:id="rId17"/>
-    <p:sldId id="273" r:id="rId18"/>
-    <p:sldId id="274" r:id="rId19"/>
-    <p:sldId id="259" r:id="rId20"/>
+    <p:sldId id="275" r:id="rId14"/>
+    <p:sldId id="268" r:id="rId15"/>
+    <p:sldId id="269" r:id="rId16"/>
+    <p:sldId id="270" r:id="rId17"/>
+    <p:sldId id="276" r:id="rId18"/>
+    <p:sldId id="271" r:id="rId19"/>
+    <p:sldId id="273" r:id="rId20"/>
+    <p:sldId id="274" r:id="rId21"/>
+    <p:sldId id="259" r:id="rId22"/>
   </p:sldIdLst>
   <p:sldSz cx="12192000" cy="6858000"/>
   <p:notesSz cx="6858000" cy="9144000"/>
@@ -329,7 +331,7 @@
           <a:p>
             <a:fld id="{58706A98-CE2D-448F-91F0-24396E3DA62F}" type="datetimeFigureOut">
               <a:rPr lang="pt-BR" smtClean="0"/>
-              <a:t>13/10/2020</a:t>
+              <a:t>14/11/2020</a:t>
             </a:fld>
             <a:endParaRPr lang="pt-BR"/>
           </a:p>
@@ -644,7 +646,7 @@
           <a:p>
             <a:fld id="{28213A33-BCF6-4071-81B0-5B43E788B58B}" type="datetime1">
               <a:rPr lang="pt-BR" smtClean="0"/>
-              <a:t>13/10/2020</a:t>
+              <a:t>14/11/2020</a:t>
             </a:fld>
             <a:endParaRPr lang="pt-BR"/>
           </a:p>
@@ -4200,7 +4202,7 @@
           <a:p>
             <a:fld id="{06683809-F987-48B9-BAEE-68ADA7F00900}" type="datetime1">
               <a:rPr lang="pt-BR" smtClean="0"/>
-              <a:t>13/10/2020</a:t>
+              <a:t>14/11/2020</a:t>
             </a:fld>
             <a:endParaRPr lang="pt-BR"/>
           </a:p>
@@ -4878,7 +4880,7 @@
           <a:p>
             <a:fld id="{D9045253-9AAF-4C65-ACCC-31FDE3B9A514}" type="datetime1">
               <a:rPr lang="pt-BR" smtClean="0"/>
-              <a:t>13/10/2020</a:t>
+              <a:t>14/11/2020</a:t>
             </a:fld>
             <a:endParaRPr lang="pt-BR"/>
           </a:p>
@@ -5110,7 +5112,7 @@
           <a:p>
             <a:fld id="{E5E2804B-0A02-46B0-8CA3-7A7805477AED}" type="datetime1">
               <a:rPr lang="pt-BR" smtClean="0"/>
-              <a:t>13/10/2020</a:t>
+              <a:t>14/11/2020</a:t>
             </a:fld>
             <a:endParaRPr lang="pt-BR"/>
           </a:p>
@@ -5419,7 +5421,7 @@
           <a:p>
             <a:fld id="{90845BCD-7974-4DDD-846A-F74800F5816A}" type="datetime1">
               <a:rPr lang="pt-BR" smtClean="0"/>
-              <a:t>13/10/2020</a:t>
+              <a:t>14/11/2020</a:t>
             </a:fld>
             <a:endParaRPr lang="pt-BR"/>
           </a:p>
@@ -5789,7 +5791,7 @@
           <a:p>
             <a:fld id="{2ACC3A85-A7C1-4BFF-AB05-9B38BBAF216E}" type="datetime1">
               <a:rPr lang="pt-BR" smtClean="0"/>
-              <a:t>13/10/2020</a:t>
+              <a:t>14/11/2020</a:t>
             </a:fld>
             <a:endParaRPr lang="pt-BR"/>
           </a:p>
@@ -9246,7 +9248,7 @@
           <a:p>
             <a:fld id="{540245D8-E04F-4685-980A-CCAB93EA9B07}" type="datetime1">
               <a:rPr lang="pt-BR" smtClean="0"/>
-              <a:t>13/10/2020</a:t>
+              <a:t>14/11/2020</a:t>
             </a:fld>
             <a:endParaRPr lang="pt-BR"/>
           </a:p>
@@ -9701,69 +9703,12 @@
           <a:chExt cx="0" cy="0"/>
         </a:xfrm>
       </p:grpSpPr>
-      <p:sp>
-        <p:nvSpPr>
-          <p:cNvPr id="2" name="Título 1">
-            <a:extLst>
-              <a:ext uri="{FF2B5EF4-FFF2-40B4-BE49-F238E27FC236}">
-                <a16:creationId xmlns:a16="http://schemas.microsoft.com/office/drawing/2014/main" id="{F47EDB66-3B6C-40B2-BDEA-4D06196E6BC1}"/>
-              </a:ext>
-            </a:extLst>
-          </p:cNvPr>
-          <p:cNvSpPr>
-            <a:spLocks noGrp="1"/>
-          </p:cNvSpPr>
-          <p:nvPr>
-            <p:ph type="title"/>
-          </p:nvPr>
-        </p:nvSpPr>
-        <p:spPr/>
-        <p:txBody>
-          <a:bodyPr/>
-          <a:lstStyle/>
-          <a:p>
-            <a:r>
-              <a:rPr lang="pt-BR" dirty="0"/>
-              <a:t>Ferramentas</a:t>
-            </a:r>
-          </a:p>
-        </p:txBody>
-      </p:sp>
-      <p:sp>
-        <p:nvSpPr>
-          <p:cNvPr id="4" name="Espaço Reservado para Número de Slide 3">
-            <a:extLst>
-              <a:ext uri="{FF2B5EF4-FFF2-40B4-BE49-F238E27FC236}">
-                <a16:creationId xmlns:a16="http://schemas.microsoft.com/office/drawing/2014/main" id="{9751B6BD-775F-4086-8BCD-C55BB5B49FDB}"/>
-              </a:ext>
-            </a:extLst>
-          </p:cNvPr>
-          <p:cNvSpPr>
-            <a:spLocks noGrp="1"/>
-          </p:cNvSpPr>
-          <p:nvPr>
-            <p:ph type="sldNum" sz="quarter" idx="12"/>
-          </p:nvPr>
-        </p:nvSpPr>
-        <p:spPr/>
-        <p:txBody>
-          <a:bodyPr/>
-          <a:lstStyle/>
-          <a:p>
-            <a:fld id="{BFAA6DF7-C204-4645-883D-6118CE896862}" type="slidenum">
-              <a:rPr lang="pt-BR" smtClean="0"/>
-              <a:t>10</a:t>
-            </a:fld>
-            <a:endParaRPr lang="pt-BR"/>
-          </a:p>
-        </p:txBody>
-      </p:sp>
       <p:pic>
         <p:nvPicPr>
-          <p:cNvPr id="1028" name="Picture 4">
-            <a:extLst>
-              <a:ext uri="{FF2B5EF4-FFF2-40B4-BE49-F238E27FC236}">
-                <a16:creationId xmlns:a16="http://schemas.microsoft.com/office/drawing/2014/main" id="{886BDD18-9F84-4F46-B589-05EDD9900BD7}"/>
+          <p:cNvPr id="2050" name="Picture 2" descr="Understanding Confusion Matrix. When we get the data, after data… | by  Sarang Narkhede | Towards Data Science">
+            <a:extLst>
+              <a:ext uri="{FF2B5EF4-FFF2-40B4-BE49-F238E27FC236}">
+                <a16:creationId xmlns:a16="http://schemas.microsoft.com/office/drawing/2014/main" id="{50C853D7-4E76-4DF2-B237-B033298ADC54}"/>
               </a:ext>
             </a:extLst>
           </p:cNvPr>
@@ -9787,8 +9732,8 @@
         </p:blipFill>
         <p:spPr bwMode="auto">
           <a:xfrm>
-            <a:off x="419934" y="1809723"/>
-            <a:ext cx="4552950" cy="1348100"/>
+            <a:off x="838200" y="2232089"/>
+            <a:ext cx="5037588" cy="3707316"/>
           </a:xfrm>
           <a:prstGeom prst="rect">
             <a:avLst/>
@@ -9805,21 +9750,340 @@
           </a:extLst>
         </p:spPr>
       </p:pic>
+      <p:sp>
+        <p:nvSpPr>
+          <p:cNvPr id="2" name="Título 1">
+            <a:extLst>
+              <a:ext uri="{FF2B5EF4-FFF2-40B4-BE49-F238E27FC236}">
+                <a16:creationId xmlns:a16="http://schemas.microsoft.com/office/drawing/2014/main" id="{EFE6ACDB-DFE7-4F4E-A370-96F288261C6C}"/>
+              </a:ext>
+            </a:extLst>
+          </p:cNvPr>
+          <p:cNvSpPr>
+            <a:spLocks noGrp="1"/>
+          </p:cNvSpPr>
+          <p:nvPr>
+            <p:ph type="title"/>
+          </p:nvPr>
+        </p:nvSpPr>
+        <p:spPr/>
+        <p:txBody>
+          <a:bodyPr/>
+          <a:lstStyle/>
+          <a:p>
+            <a:r>
+              <a:rPr lang="pt-BR" dirty="0"/>
+              <a:t>Validação</a:t>
+            </a:r>
+          </a:p>
+        </p:txBody>
+      </p:sp>
+      <p:sp>
+        <p:nvSpPr>
+          <p:cNvPr id="3" name="Espaço Reservado para Conteúdo 2">
+            <a:extLst>
+              <a:ext uri="{FF2B5EF4-FFF2-40B4-BE49-F238E27FC236}">
+                <a16:creationId xmlns:a16="http://schemas.microsoft.com/office/drawing/2014/main" id="{FBB48958-AFA4-49FD-BCF4-61F73DF6026E}"/>
+              </a:ext>
+            </a:extLst>
+          </p:cNvPr>
+          <p:cNvSpPr>
+            <a:spLocks noGrp="1"/>
+          </p:cNvSpPr>
+          <p:nvPr>
+            <p:ph idx="1"/>
+          </p:nvPr>
+        </p:nvSpPr>
+        <p:spPr>
+          <a:xfrm>
+            <a:off x="702769" y="1690688"/>
+            <a:ext cx="5760250" cy="3981237"/>
+          </a:xfrm>
+        </p:spPr>
+        <p:txBody>
+          <a:bodyPr/>
+          <a:lstStyle/>
+          <a:p>
+            <a:r>
+              <a:rPr lang="pt-PT" dirty="0">
+                <a:solidFill>
+                  <a:schemeClr val="tx1"/>
+                </a:solidFill>
+              </a:rPr>
+              <a:t>Acurácia:</a:t>
+            </a:r>
+            <a:r>
+              <a:rPr lang="pt-PT" dirty="0">
+                <a:solidFill>
+                  <a:srgbClr val="6AA84F"/>
+                </a:solidFill>
+              </a:rPr>
+              <a:t> (TP+TN)</a:t>
+            </a:r>
+            <a:r>
+              <a:rPr lang="pt-PT" dirty="0"/>
+              <a:t>/</a:t>
+            </a:r>
+            <a:r>
+              <a:rPr lang="pt-PT" dirty="0">
+                <a:solidFill>
+                  <a:srgbClr val="CC0000"/>
+                </a:solidFill>
+              </a:rPr>
+              <a:t>(TP+FP+FN+TN)</a:t>
+            </a:r>
+          </a:p>
+          <a:p>
+            <a:endParaRPr lang="pt-BR" dirty="0"/>
+          </a:p>
+        </p:txBody>
+      </p:sp>
+      <p:sp>
+        <p:nvSpPr>
+          <p:cNvPr id="4" name="Espaço Reservado para Número de Slide 3">
+            <a:extLst>
+              <a:ext uri="{FF2B5EF4-FFF2-40B4-BE49-F238E27FC236}">
+                <a16:creationId xmlns:a16="http://schemas.microsoft.com/office/drawing/2014/main" id="{B001ED34-CCE5-4DAA-88C2-069C0DD9DD86}"/>
+              </a:ext>
+            </a:extLst>
+          </p:cNvPr>
+          <p:cNvSpPr>
+            <a:spLocks noGrp="1"/>
+          </p:cNvSpPr>
+          <p:nvPr>
+            <p:ph type="sldNum" sz="quarter" idx="12"/>
+          </p:nvPr>
+        </p:nvSpPr>
+        <p:spPr/>
+        <p:txBody>
+          <a:bodyPr/>
+          <a:lstStyle/>
+          <a:p>
+            <a:fld id="{BFAA6DF7-C204-4645-883D-6118CE896862}" type="slidenum">
+              <a:rPr lang="pt-BR" smtClean="0"/>
+              <a:t>10</a:t>
+            </a:fld>
+            <a:endParaRPr lang="pt-BR"/>
+          </a:p>
+        </p:txBody>
+      </p:sp>
+      <p:sp>
+        <p:nvSpPr>
+          <p:cNvPr id="9" name="Google Shape;518;g6b0ee7d360_0_31">
+            <a:extLst>
+              <a:ext uri="{FF2B5EF4-FFF2-40B4-BE49-F238E27FC236}">
+                <a16:creationId xmlns:a16="http://schemas.microsoft.com/office/drawing/2014/main" id="{E60D20A0-23CF-4ECE-9BEA-CAAF76FC69DC}"/>
+              </a:ext>
+            </a:extLst>
+          </p:cNvPr>
+          <p:cNvSpPr/>
+          <p:nvPr/>
+        </p:nvSpPr>
+        <p:spPr>
+          <a:xfrm>
+            <a:off x="1348524" y="2617655"/>
+            <a:ext cx="4599269" cy="3422417"/>
+          </a:xfrm>
+          <a:prstGeom prst="roundRect">
+            <a:avLst>
+              <a:gd name="adj" fmla="val 16667"/>
+            </a:avLst>
+          </a:prstGeom>
+          <a:noFill/>
+          <a:ln w="38100" cap="flat" cmpd="sng">
+            <a:solidFill>
+              <a:srgbClr val="CC0000"/>
+            </a:solidFill>
+            <a:prstDash val="solid"/>
+            <a:round/>
+            <a:headEnd type="none" w="sm" len="sm"/>
+            <a:tailEnd type="none" w="sm" len="sm"/>
+          </a:ln>
+        </p:spPr>
+        <p:txBody>
+          <a:bodyPr spcFirstLastPara="1" wrap="square" lIns="91425" tIns="91425" rIns="91425" bIns="91425" anchor="ctr" anchorCtr="0">
+            <a:noAutofit/>
+          </a:bodyPr>
+          <a:lstStyle/>
+          <a:p>
+            <a:pPr marL="0" marR="0" lvl="0" indent="0" algn="l" rtl="0">
+              <a:lnSpc>
+                <a:spcPct val="100000"/>
+              </a:lnSpc>
+              <a:spcBef>
+                <a:spcPts val="0"/>
+              </a:spcBef>
+              <a:spcAft>
+                <a:spcPts val="0"/>
+              </a:spcAft>
+              <a:buClr>
+                <a:srgbClr val="000000"/>
+              </a:buClr>
+              <a:buSzPts val="1400"/>
+              <a:buFont typeface="Arial"/>
+              <a:buNone/>
+            </a:pPr>
+            <a:endParaRPr sz="1400" b="0" i="0" u="none" strike="noStrike" cap="none">
+              <a:solidFill>
+                <a:srgbClr val="CC0000"/>
+              </a:solidFill>
+              <a:latin typeface="Arial"/>
+              <a:ea typeface="Arial"/>
+              <a:cs typeface="Arial"/>
+              <a:sym typeface="Arial"/>
+            </a:endParaRPr>
+          </a:p>
+        </p:txBody>
+      </p:sp>
+      <p:sp>
+        <p:nvSpPr>
+          <p:cNvPr id="13" name="Google Shape;520;g6b0ee7d360_0_31">
+            <a:extLst>
+              <a:ext uri="{FF2B5EF4-FFF2-40B4-BE49-F238E27FC236}">
+                <a16:creationId xmlns:a16="http://schemas.microsoft.com/office/drawing/2014/main" id="{4412C123-D495-42B9-B030-A7F17C2B55D1}"/>
+              </a:ext>
+            </a:extLst>
+          </p:cNvPr>
+          <p:cNvSpPr/>
+          <p:nvPr/>
+        </p:nvSpPr>
+        <p:spPr>
+          <a:xfrm>
+            <a:off x="1630271" y="2943572"/>
+            <a:ext cx="1951828" cy="1460648"/>
+          </a:xfrm>
+          <a:prstGeom prst="roundRect">
+            <a:avLst>
+              <a:gd name="adj" fmla="val 16667"/>
+            </a:avLst>
+          </a:prstGeom>
+          <a:noFill/>
+          <a:ln w="38100" cap="flat" cmpd="sng">
+            <a:solidFill>
+              <a:srgbClr val="6AA84F"/>
+            </a:solidFill>
+            <a:prstDash val="solid"/>
+            <a:round/>
+            <a:headEnd type="none" w="sm" len="sm"/>
+            <a:tailEnd type="none" w="sm" len="sm"/>
+          </a:ln>
+        </p:spPr>
+        <p:txBody>
+          <a:bodyPr spcFirstLastPara="1" wrap="square" lIns="91425" tIns="91425" rIns="91425" bIns="91425" anchor="ctr" anchorCtr="0">
+            <a:noAutofit/>
+          </a:bodyPr>
+          <a:lstStyle/>
+          <a:p>
+            <a:pPr marL="0" marR="0" lvl="0" indent="0" algn="l" rtl="0">
+              <a:lnSpc>
+                <a:spcPct val="100000"/>
+              </a:lnSpc>
+              <a:spcBef>
+                <a:spcPts val="0"/>
+              </a:spcBef>
+              <a:spcAft>
+                <a:spcPts val="0"/>
+              </a:spcAft>
+              <a:buClr>
+                <a:srgbClr val="000000"/>
+              </a:buClr>
+              <a:buSzPts val="1400"/>
+              <a:buFont typeface="Arial"/>
+              <a:buNone/>
+            </a:pPr>
+            <a:endParaRPr sz="1400" b="0" i="0" u="none" strike="noStrike" cap="none">
+              <a:solidFill>
+                <a:srgbClr val="000000"/>
+              </a:solidFill>
+              <a:latin typeface="Arial"/>
+              <a:ea typeface="Arial"/>
+              <a:cs typeface="Arial"/>
+              <a:sym typeface="Arial"/>
+            </a:endParaRPr>
+          </a:p>
+        </p:txBody>
+      </p:sp>
+      <p:sp>
+        <p:nvSpPr>
+          <p:cNvPr id="16" name="Google Shape;520;g6b0ee7d360_0_31">
+            <a:extLst>
+              <a:ext uri="{FF2B5EF4-FFF2-40B4-BE49-F238E27FC236}">
+                <a16:creationId xmlns:a16="http://schemas.microsoft.com/office/drawing/2014/main" id="{B5496D4B-53B7-450C-88F9-C80E56551735}"/>
+              </a:ext>
+            </a:extLst>
+          </p:cNvPr>
+          <p:cNvSpPr/>
+          <p:nvPr/>
+        </p:nvSpPr>
+        <p:spPr>
+          <a:xfrm>
+            <a:off x="3717530" y="4404220"/>
+            <a:ext cx="1951828" cy="1460648"/>
+          </a:xfrm>
+          <a:prstGeom prst="roundRect">
+            <a:avLst>
+              <a:gd name="adj" fmla="val 16667"/>
+            </a:avLst>
+          </a:prstGeom>
+          <a:noFill/>
+          <a:ln w="38100" cap="flat" cmpd="sng">
+            <a:solidFill>
+              <a:srgbClr val="6AA84F"/>
+            </a:solidFill>
+            <a:prstDash val="solid"/>
+            <a:round/>
+            <a:headEnd type="none" w="sm" len="sm"/>
+            <a:tailEnd type="none" w="sm" len="sm"/>
+          </a:ln>
+        </p:spPr>
+        <p:txBody>
+          <a:bodyPr spcFirstLastPara="1" wrap="square" lIns="91425" tIns="91425" rIns="91425" bIns="91425" anchor="ctr" anchorCtr="0">
+            <a:noAutofit/>
+          </a:bodyPr>
+          <a:lstStyle/>
+          <a:p>
+            <a:pPr marL="0" marR="0" lvl="0" indent="0" algn="l" rtl="0">
+              <a:lnSpc>
+                <a:spcPct val="100000"/>
+              </a:lnSpc>
+              <a:spcBef>
+                <a:spcPts val="0"/>
+              </a:spcBef>
+              <a:spcAft>
+                <a:spcPts val="0"/>
+              </a:spcAft>
+              <a:buClr>
+                <a:srgbClr val="000000"/>
+              </a:buClr>
+              <a:buSzPts val="1400"/>
+              <a:buFont typeface="Arial"/>
+              <a:buNone/>
+            </a:pPr>
+            <a:endParaRPr sz="1400" b="0" i="0" u="none" strike="noStrike" cap="none">
+              <a:solidFill>
+                <a:srgbClr val="000000"/>
+              </a:solidFill>
+              <a:latin typeface="Arial"/>
+              <a:ea typeface="Arial"/>
+              <a:cs typeface="Arial"/>
+              <a:sym typeface="Arial"/>
+            </a:endParaRPr>
+          </a:p>
+        </p:txBody>
+      </p:sp>
       <p:pic>
         <p:nvPicPr>
-          <p:cNvPr id="1030" name="Picture 6">
-            <a:extLst>
-              <a:ext uri="{FF2B5EF4-FFF2-40B4-BE49-F238E27FC236}">
-                <a16:creationId xmlns:a16="http://schemas.microsoft.com/office/drawing/2014/main" id="{D00660D7-8D03-48F7-AAD7-E1B8F5FA9744}"/>
+          <p:cNvPr id="2052" name="Picture 4" descr="Сomics meme: &quot;False Negative False Positive&quot; - Comics - Meme-arsenal.com">
+            <a:extLst>
+              <a:ext uri="{FF2B5EF4-FFF2-40B4-BE49-F238E27FC236}">
+                <a16:creationId xmlns:a16="http://schemas.microsoft.com/office/drawing/2014/main" id="{835F2CCA-67D4-4D81-A358-AD4AF0BB502F}"/>
               </a:ext>
             </a:extLst>
           </p:cNvPr>
           <p:cNvPicPr>
-            <a:picLocks noGrp="1" noChangeAspect="1" noChangeArrowheads="1"/>
+            <a:picLocks noChangeAspect="1" noChangeArrowheads="1"/>
           </p:cNvPicPr>
-          <p:nvPr>
-            <p:ph idx="1"/>
-          </p:nvPr>
+          <p:nvPr/>
         </p:nvPicPr>
         <p:blipFill>
           <a:blip r:embed="rId3">
@@ -9836,8 +10100,8 @@
         </p:blipFill>
         <p:spPr bwMode="auto">
           <a:xfrm>
-            <a:off x="419934" y="3748074"/>
-            <a:ext cx="1874755" cy="1452888"/>
+            <a:off x="7389090" y="1211835"/>
+            <a:ext cx="3349917" cy="5144515"/>
           </a:xfrm>
           <a:prstGeom prst="rect">
             <a:avLst/>
@@ -9854,198 +10118,10 @@
           </a:extLst>
         </p:spPr>
       </p:pic>
-      <p:pic>
-        <p:nvPicPr>
-          <p:cNvPr id="1032" name="Picture 8" descr="RStudio Logo Usage Guidelines - RStudio">
-            <a:extLst>
-              <a:ext uri="{FF2B5EF4-FFF2-40B4-BE49-F238E27FC236}">
-                <a16:creationId xmlns:a16="http://schemas.microsoft.com/office/drawing/2014/main" id="{EE15A4A5-ED28-47F7-B988-FC425020DE15}"/>
-              </a:ext>
-            </a:extLst>
-          </p:cNvPr>
-          <p:cNvPicPr>
-            <a:picLocks noChangeAspect="1" noChangeArrowheads="1"/>
-          </p:cNvPicPr>
-          <p:nvPr/>
-        </p:nvPicPr>
-        <p:blipFill>
-          <a:blip r:embed="rId4">
-            <a:extLst>
-              <a:ext uri="{28A0092B-C50C-407E-A947-70E740481C1C}">
-                <a14:useLocalDpi xmlns:a14="http://schemas.microsoft.com/office/drawing/2010/main" val="0"/>
-              </a:ext>
-            </a:extLst>
-          </a:blip>
-          <a:srcRect/>
-          <a:stretch>
-            <a:fillRect/>
-          </a:stretch>
-        </p:blipFill>
-        <p:spPr bwMode="auto">
-          <a:xfrm>
-            <a:off x="3808470" y="4250402"/>
-            <a:ext cx="3333750" cy="1170719"/>
-          </a:xfrm>
-          <a:prstGeom prst="rect">
-            <a:avLst/>
-          </a:prstGeom>
-          <a:noFill/>
-          <a:extLst>
-            <a:ext uri="{909E8E84-426E-40DD-AFC4-6F175D3DCCD1}">
-              <a14:hiddenFill xmlns:a14="http://schemas.microsoft.com/office/drawing/2010/main">
-                <a:solidFill>
-                  <a:srgbClr val="FFFFFF"/>
-                </a:solidFill>
-              </a14:hiddenFill>
-            </a:ext>
-          </a:extLst>
-        </p:spPr>
-      </p:pic>
-      <p:pic>
-        <p:nvPicPr>
-          <p:cNvPr id="1034" name="Picture 10">
-            <a:extLst>
-              <a:ext uri="{FF2B5EF4-FFF2-40B4-BE49-F238E27FC236}">
-                <a16:creationId xmlns:a16="http://schemas.microsoft.com/office/drawing/2014/main" id="{55F2A9D1-BCEB-4828-A338-C751AE5FE689}"/>
-              </a:ext>
-            </a:extLst>
-          </p:cNvPr>
-          <p:cNvPicPr>
-            <a:picLocks noChangeAspect="1" noChangeArrowheads="1"/>
-          </p:cNvPicPr>
-          <p:nvPr/>
-        </p:nvPicPr>
-        <p:blipFill>
-          <a:blip r:embed="rId5">
-            <a:extLst>
-              <a:ext uri="{28A0092B-C50C-407E-A947-70E740481C1C}">
-                <a14:useLocalDpi xmlns:a14="http://schemas.microsoft.com/office/drawing/2010/main" val="0"/>
-              </a:ext>
-            </a:extLst>
-          </a:blip>
-          <a:srcRect/>
-          <a:stretch>
-            <a:fillRect/>
-          </a:stretch>
-        </p:blipFill>
-        <p:spPr bwMode="auto">
-          <a:xfrm>
-            <a:off x="5475345" y="1550858"/>
-            <a:ext cx="1676374" cy="1943100"/>
-          </a:xfrm>
-          <a:prstGeom prst="rect">
-            <a:avLst/>
-          </a:prstGeom>
-          <a:noFill/>
-          <a:extLst>
-            <a:ext uri="{909E8E84-426E-40DD-AFC4-6F175D3DCCD1}">
-              <a14:hiddenFill xmlns:a14="http://schemas.microsoft.com/office/drawing/2010/main">
-                <a:solidFill>
-                  <a:srgbClr val="FFFFFF"/>
-                </a:solidFill>
-              </a14:hiddenFill>
-            </a:ext>
-          </a:extLst>
-        </p:spPr>
-      </p:pic>
-      <p:pic>
-        <p:nvPicPr>
-          <p:cNvPr id="1036" name="Picture 12" descr="Anaconda (Python distribution) - Wikipedia">
-            <a:extLst>
-              <a:ext uri="{FF2B5EF4-FFF2-40B4-BE49-F238E27FC236}">
-                <a16:creationId xmlns:a16="http://schemas.microsoft.com/office/drawing/2014/main" id="{43CAB7D0-6AAD-4186-9191-7AE7E673F211}"/>
-              </a:ext>
-            </a:extLst>
-          </p:cNvPr>
-          <p:cNvPicPr>
-            <a:picLocks noChangeAspect="1" noChangeArrowheads="1"/>
-          </p:cNvPicPr>
-          <p:nvPr/>
-        </p:nvPicPr>
-        <p:blipFill>
-          <a:blip r:embed="rId6">
-            <a:extLst>
-              <a:ext uri="{28A0092B-C50C-407E-A947-70E740481C1C}">
-                <a14:useLocalDpi xmlns:a14="http://schemas.microsoft.com/office/drawing/2010/main" val="0"/>
-              </a:ext>
-            </a:extLst>
-          </a:blip>
-          <a:srcRect/>
-          <a:stretch>
-            <a:fillRect/>
-          </a:stretch>
-        </p:blipFill>
-        <p:spPr bwMode="auto">
-          <a:xfrm>
-            <a:off x="7729536" y="1690688"/>
-            <a:ext cx="4257675" cy="2124075"/>
-          </a:xfrm>
-          <a:prstGeom prst="rect">
-            <a:avLst/>
-          </a:prstGeom>
-          <a:noFill/>
-          <a:extLst>
-            <a:ext uri="{909E8E84-426E-40DD-AFC4-6F175D3DCCD1}">
-              <a14:hiddenFill xmlns:a14="http://schemas.microsoft.com/office/drawing/2010/main">
-                <a:solidFill>
-                  <a:srgbClr val="FFFFFF"/>
-                </a:solidFill>
-              </a14:hiddenFill>
-            </a:ext>
-          </a:extLst>
-        </p:spPr>
-      </p:pic>
-      <p:pic>
-        <p:nvPicPr>
-          <p:cNvPr id="1038" name="Picture 14" descr="Google Colab: saiba o que é e porque usar! - Blog da Trybe">
-            <a:extLst>
-              <a:ext uri="{FF2B5EF4-FFF2-40B4-BE49-F238E27FC236}">
-                <a16:creationId xmlns:a16="http://schemas.microsoft.com/office/drawing/2014/main" id="{A589D287-D097-40A2-BC6B-0C5594A72703}"/>
-              </a:ext>
-            </a:extLst>
-          </p:cNvPr>
-          <p:cNvPicPr>
-            <a:picLocks noChangeAspect="1" noChangeArrowheads="1"/>
-          </p:cNvPicPr>
-          <p:nvPr/>
-        </p:nvPicPr>
-        <p:blipFill>
-          <a:blip r:embed="rId7">
-            <a:extLst>
-              <a:ext uri="{28A0092B-C50C-407E-A947-70E740481C1C}">
-                <a14:useLocalDpi xmlns:a14="http://schemas.microsoft.com/office/drawing/2010/main" val="0"/>
-              </a:ext>
-            </a:extLst>
-          </a:blip>
-          <a:srcRect/>
-          <a:stretch>
-            <a:fillRect/>
-          </a:stretch>
-        </p:blipFill>
-        <p:spPr bwMode="auto">
-          <a:xfrm>
-            <a:off x="8352099" y="4374227"/>
-            <a:ext cx="3012551" cy="1506276"/>
-          </a:xfrm>
-          <a:prstGeom prst="rect">
-            <a:avLst/>
-          </a:prstGeom>
-          <a:noFill/>
-          <a:extLst>
-            <a:ext uri="{909E8E84-426E-40DD-AFC4-6F175D3DCCD1}">
-              <a14:hiddenFill xmlns:a14="http://schemas.microsoft.com/office/drawing/2010/main">
-                <a:solidFill>
-                  <a:srgbClr val="FFFFFF"/>
-                </a:solidFill>
-              </a14:hiddenFill>
-            </a:ext>
-          </a:extLst>
-        </p:spPr>
-      </p:pic>
     </p:spTree>
     <p:extLst>
       <p:ext uri="{BB962C8B-B14F-4D97-AF65-F5344CB8AC3E}">
-        <p14:creationId xmlns:p14="http://schemas.microsoft.com/office/powerpoint/2010/main" val="3766381720"/>
+        <p14:creationId xmlns:p14="http://schemas.microsoft.com/office/powerpoint/2010/main" val="635854207"/>
       </p:ext>
     </p:extLst>
   </p:cSld>
@@ -10077,7 +10153,7 @@
           <p:cNvPr id="2" name="Título 1">
             <a:extLst>
               <a:ext uri="{FF2B5EF4-FFF2-40B4-BE49-F238E27FC236}">
-                <a16:creationId xmlns:a16="http://schemas.microsoft.com/office/drawing/2014/main" id="{94C86850-FF9D-4AC0-97AE-8A5BEDE72B63}"/>
+                <a16:creationId xmlns:a16="http://schemas.microsoft.com/office/drawing/2014/main" id="{F47EDB66-3B6C-40B2-BDEA-4D06196E6BC1}"/>
               </a:ext>
             </a:extLst>
           </p:cNvPr>
@@ -10095,33 +10171,8 @@
           <a:p>
             <a:r>
               <a:rPr lang="pt-BR" dirty="0"/>
-              <a:t>Prática</a:t>
-            </a:r>
-          </a:p>
-        </p:txBody>
-      </p:sp>
-      <p:sp>
-        <p:nvSpPr>
-          <p:cNvPr id="3" name="Espaço Reservado para Conteúdo 2">
-            <a:extLst>
-              <a:ext uri="{FF2B5EF4-FFF2-40B4-BE49-F238E27FC236}">
-                <a16:creationId xmlns:a16="http://schemas.microsoft.com/office/drawing/2014/main" id="{EF30E35C-AA7F-4E57-8A65-652E609D43C1}"/>
-              </a:ext>
-            </a:extLst>
-          </p:cNvPr>
-          <p:cNvSpPr>
-            <a:spLocks noGrp="1"/>
-          </p:cNvSpPr>
-          <p:nvPr>
-            <p:ph idx="1"/>
-          </p:nvPr>
-        </p:nvSpPr>
-        <p:spPr/>
-        <p:txBody>
-          <a:bodyPr/>
-          <a:lstStyle/>
-          <a:p>
-            <a:endParaRPr lang="pt-BR" dirty="0"/>
+              <a:t>Ferramentas</a:t>
+            </a:r>
           </a:p>
         </p:txBody>
       </p:sp>
@@ -10130,7 +10181,7 @@
           <p:cNvPr id="4" name="Espaço Reservado para Número de Slide 3">
             <a:extLst>
               <a:ext uri="{FF2B5EF4-FFF2-40B4-BE49-F238E27FC236}">
-                <a16:creationId xmlns:a16="http://schemas.microsoft.com/office/drawing/2014/main" id="{818FF0AD-1975-4760-8379-69B55DEAE1DB}"/>
+                <a16:creationId xmlns:a16="http://schemas.microsoft.com/office/drawing/2014/main" id="{9751B6BD-775F-4086-8BCD-C55BB5B49FDB}"/>
               </a:ext>
             </a:extLst>
           </p:cNvPr>
@@ -10156,10 +10207,10 @@
       </p:sp>
       <p:pic>
         <p:nvPicPr>
-          <p:cNvPr id="5" name="Picture 6">
-            <a:extLst>
-              <a:ext uri="{FF2B5EF4-FFF2-40B4-BE49-F238E27FC236}">
-                <a16:creationId xmlns:a16="http://schemas.microsoft.com/office/drawing/2014/main" id="{1BD54061-0954-4EFC-B7F6-1B5607BBF341}"/>
+          <p:cNvPr id="1028" name="Picture 4">
+            <a:extLst>
+              <a:ext uri="{FF2B5EF4-FFF2-40B4-BE49-F238E27FC236}">
+                <a16:creationId xmlns:a16="http://schemas.microsoft.com/office/drawing/2014/main" id="{886BDD18-9F84-4F46-B589-05EDD9900BD7}"/>
               </a:ext>
             </a:extLst>
           </p:cNvPr>
@@ -10183,8 +10234,8 @@
         </p:blipFill>
         <p:spPr bwMode="auto">
           <a:xfrm>
-            <a:off x="2524960" y="2922715"/>
-            <a:ext cx="1874755" cy="1452888"/>
+            <a:off x="419934" y="1809723"/>
+            <a:ext cx="4552950" cy="1348100"/>
           </a:xfrm>
           <a:prstGeom prst="rect">
             <a:avLst/>
@@ -10203,17 +10254,19 @@
       </p:pic>
       <p:pic>
         <p:nvPicPr>
-          <p:cNvPr id="6" name="Picture 8" descr="RStudio Logo Usage Guidelines - RStudio">
-            <a:extLst>
-              <a:ext uri="{FF2B5EF4-FFF2-40B4-BE49-F238E27FC236}">
-                <a16:creationId xmlns:a16="http://schemas.microsoft.com/office/drawing/2014/main" id="{5A72BB43-A410-43A1-9CA6-740293FF3766}"/>
+          <p:cNvPr id="1030" name="Picture 6">
+            <a:extLst>
+              <a:ext uri="{FF2B5EF4-FFF2-40B4-BE49-F238E27FC236}">
+                <a16:creationId xmlns:a16="http://schemas.microsoft.com/office/drawing/2014/main" id="{D00660D7-8D03-48F7-AAD7-E1B8F5FA9744}"/>
               </a:ext>
             </a:extLst>
           </p:cNvPr>
           <p:cNvPicPr>
-            <a:picLocks noChangeAspect="1" noChangeArrowheads="1"/>
+            <a:picLocks noGrp="1" noChangeAspect="1" noChangeArrowheads="1"/>
           </p:cNvPicPr>
-          <p:nvPr/>
+          <p:nvPr>
+            <p:ph idx="1"/>
+          </p:nvPr>
         </p:nvPicPr>
         <p:blipFill>
           <a:blip r:embed="rId3">
@@ -10230,8 +10283,8 @@
         </p:blipFill>
         <p:spPr bwMode="auto">
           <a:xfrm>
-            <a:off x="6125412" y="3230883"/>
-            <a:ext cx="3333750" cy="1170719"/>
+            <a:off x="419934" y="3748074"/>
+            <a:ext cx="1874755" cy="1452888"/>
           </a:xfrm>
           <a:prstGeom prst="rect">
             <a:avLst/>
@@ -10248,10 +10301,198 @@
           </a:extLst>
         </p:spPr>
       </p:pic>
+      <p:pic>
+        <p:nvPicPr>
+          <p:cNvPr id="1032" name="Picture 8" descr="RStudio Logo Usage Guidelines - RStudio">
+            <a:extLst>
+              <a:ext uri="{FF2B5EF4-FFF2-40B4-BE49-F238E27FC236}">
+                <a16:creationId xmlns:a16="http://schemas.microsoft.com/office/drawing/2014/main" id="{EE15A4A5-ED28-47F7-B988-FC425020DE15}"/>
+              </a:ext>
+            </a:extLst>
+          </p:cNvPr>
+          <p:cNvPicPr>
+            <a:picLocks noChangeAspect="1" noChangeArrowheads="1"/>
+          </p:cNvPicPr>
+          <p:nvPr/>
+        </p:nvPicPr>
+        <p:blipFill>
+          <a:blip r:embed="rId4">
+            <a:extLst>
+              <a:ext uri="{28A0092B-C50C-407E-A947-70E740481C1C}">
+                <a14:useLocalDpi xmlns:a14="http://schemas.microsoft.com/office/drawing/2010/main" val="0"/>
+              </a:ext>
+            </a:extLst>
+          </a:blip>
+          <a:srcRect/>
+          <a:stretch>
+            <a:fillRect/>
+          </a:stretch>
+        </p:blipFill>
+        <p:spPr bwMode="auto">
+          <a:xfrm>
+            <a:off x="3808470" y="4250402"/>
+            <a:ext cx="3333750" cy="1170719"/>
+          </a:xfrm>
+          <a:prstGeom prst="rect">
+            <a:avLst/>
+          </a:prstGeom>
+          <a:noFill/>
+          <a:extLst>
+            <a:ext uri="{909E8E84-426E-40DD-AFC4-6F175D3DCCD1}">
+              <a14:hiddenFill xmlns:a14="http://schemas.microsoft.com/office/drawing/2010/main">
+                <a:solidFill>
+                  <a:srgbClr val="FFFFFF"/>
+                </a:solidFill>
+              </a14:hiddenFill>
+            </a:ext>
+          </a:extLst>
+        </p:spPr>
+      </p:pic>
+      <p:pic>
+        <p:nvPicPr>
+          <p:cNvPr id="1034" name="Picture 10">
+            <a:extLst>
+              <a:ext uri="{FF2B5EF4-FFF2-40B4-BE49-F238E27FC236}">
+                <a16:creationId xmlns:a16="http://schemas.microsoft.com/office/drawing/2014/main" id="{55F2A9D1-BCEB-4828-A338-C751AE5FE689}"/>
+              </a:ext>
+            </a:extLst>
+          </p:cNvPr>
+          <p:cNvPicPr>
+            <a:picLocks noChangeAspect="1" noChangeArrowheads="1"/>
+          </p:cNvPicPr>
+          <p:nvPr/>
+        </p:nvPicPr>
+        <p:blipFill>
+          <a:blip r:embed="rId5">
+            <a:extLst>
+              <a:ext uri="{28A0092B-C50C-407E-A947-70E740481C1C}">
+                <a14:useLocalDpi xmlns:a14="http://schemas.microsoft.com/office/drawing/2010/main" val="0"/>
+              </a:ext>
+            </a:extLst>
+          </a:blip>
+          <a:srcRect/>
+          <a:stretch>
+            <a:fillRect/>
+          </a:stretch>
+        </p:blipFill>
+        <p:spPr bwMode="auto">
+          <a:xfrm>
+            <a:off x="5475345" y="1550858"/>
+            <a:ext cx="1676374" cy="1943100"/>
+          </a:xfrm>
+          <a:prstGeom prst="rect">
+            <a:avLst/>
+          </a:prstGeom>
+          <a:noFill/>
+          <a:extLst>
+            <a:ext uri="{909E8E84-426E-40DD-AFC4-6F175D3DCCD1}">
+              <a14:hiddenFill xmlns:a14="http://schemas.microsoft.com/office/drawing/2010/main">
+                <a:solidFill>
+                  <a:srgbClr val="FFFFFF"/>
+                </a:solidFill>
+              </a14:hiddenFill>
+            </a:ext>
+          </a:extLst>
+        </p:spPr>
+      </p:pic>
+      <p:pic>
+        <p:nvPicPr>
+          <p:cNvPr id="1036" name="Picture 12" descr="Anaconda (Python distribution) - Wikipedia">
+            <a:extLst>
+              <a:ext uri="{FF2B5EF4-FFF2-40B4-BE49-F238E27FC236}">
+                <a16:creationId xmlns:a16="http://schemas.microsoft.com/office/drawing/2014/main" id="{43CAB7D0-6AAD-4186-9191-7AE7E673F211}"/>
+              </a:ext>
+            </a:extLst>
+          </p:cNvPr>
+          <p:cNvPicPr>
+            <a:picLocks noChangeAspect="1" noChangeArrowheads="1"/>
+          </p:cNvPicPr>
+          <p:nvPr/>
+        </p:nvPicPr>
+        <p:blipFill>
+          <a:blip r:embed="rId6">
+            <a:extLst>
+              <a:ext uri="{28A0092B-C50C-407E-A947-70E740481C1C}">
+                <a14:useLocalDpi xmlns:a14="http://schemas.microsoft.com/office/drawing/2010/main" val="0"/>
+              </a:ext>
+            </a:extLst>
+          </a:blip>
+          <a:srcRect/>
+          <a:stretch>
+            <a:fillRect/>
+          </a:stretch>
+        </p:blipFill>
+        <p:spPr bwMode="auto">
+          <a:xfrm>
+            <a:off x="7729536" y="1690688"/>
+            <a:ext cx="4257675" cy="2124075"/>
+          </a:xfrm>
+          <a:prstGeom prst="rect">
+            <a:avLst/>
+          </a:prstGeom>
+          <a:noFill/>
+          <a:extLst>
+            <a:ext uri="{909E8E84-426E-40DD-AFC4-6F175D3DCCD1}">
+              <a14:hiddenFill xmlns:a14="http://schemas.microsoft.com/office/drawing/2010/main">
+                <a:solidFill>
+                  <a:srgbClr val="FFFFFF"/>
+                </a:solidFill>
+              </a14:hiddenFill>
+            </a:ext>
+          </a:extLst>
+        </p:spPr>
+      </p:pic>
+      <p:pic>
+        <p:nvPicPr>
+          <p:cNvPr id="1038" name="Picture 14" descr="Google Colab: saiba o que é e porque usar! - Blog da Trybe">
+            <a:extLst>
+              <a:ext uri="{FF2B5EF4-FFF2-40B4-BE49-F238E27FC236}">
+                <a16:creationId xmlns:a16="http://schemas.microsoft.com/office/drawing/2014/main" id="{A589D287-D097-40A2-BC6B-0C5594A72703}"/>
+              </a:ext>
+            </a:extLst>
+          </p:cNvPr>
+          <p:cNvPicPr>
+            <a:picLocks noChangeAspect="1" noChangeArrowheads="1"/>
+          </p:cNvPicPr>
+          <p:nvPr/>
+        </p:nvPicPr>
+        <p:blipFill>
+          <a:blip r:embed="rId7">
+            <a:extLst>
+              <a:ext uri="{28A0092B-C50C-407E-A947-70E740481C1C}">
+                <a14:useLocalDpi xmlns:a14="http://schemas.microsoft.com/office/drawing/2010/main" val="0"/>
+              </a:ext>
+            </a:extLst>
+          </a:blip>
+          <a:srcRect/>
+          <a:stretch>
+            <a:fillRect/>
+          </a:stretch>
+        </p:blipFill>
+        <p:spPr bwMode="auto">
+          <a:xfrm>
+            <a:off x="8352099" y="4374227"/>
+            <a:ext cx="3012551" cy="1506276"/>
+          </a:xfrm>
+          <a:prstGeom prst="rect">
+            <a:avLst/>
+          </a:prstGeom>
+          <a:noFill/>
+          <a:extLst>
+            <a:ext uri="{909E8E84-426E-40DD-AFC4-6F175D3DCCD1}">
+              <a14:hiddenFill xmlns:a14="http://schemas.microsoft.com/office/drawing/2010/main">
+                <a:solidFill>
+                  <a:srgbClr val="FFFFFF"/>
+                </a:solidFill>
+              </a14:hiddenFill>
+            </a:ext>
+          </a:extLst>
+        </p:spPr>
+      </p:pic>
     </p:spTree>
     <p:extLst>
       <p:ext uri="{BB962C8B-B14F-4D97-AF65-F5344CB8AC3E}">
-        <p14:creationId xmlns:p14="http://schemas.microsoft.com/office/powerpoint/2010/main" val="1433006389"/>
+        <p14:creationId xmlns:p14="http://schemas.microsoft.com/office/powerpoint/2010/main" val="3766381720"/>
       </p:ext>
     </p:extLst>
   </p:cSld>
@@ -10283,7 +10524,7 @@
           <p:cNvPr id="2" name="Título 1">
             <a:extLst>
               <a:ext uri="{FF2B5EF4-FFF2-40B4-BE49-F238E27FC236}">
-                <a16:creationId xmlns:a16="http://schemas.microsoft.com/office/drawing/2014/main" id="{91FB60FF-936A-4A17-B38E-3F62663EFFC2}"/>
+                <a16:creationId xmlns:a16="http://schemas.microsoft.com/office/drawing/2014/main" id="{94C86850-FF9D-4AC0-97AE-8A5BEDE72B63}"/>
               </a:ext>
             </a:extLst>
           </p:cNvPr>
@@ -10301,7 +10542,7 @@
           <a:p>
             <a:r>
               <a:rPr lang="pt-BR" dirty="0"/>
-              <a:t>Desafios</a:t>
+              <a:t>Prática</a:t>
             </a:r>
           </a:p>
         </p:txBody>
@@ -10311,7 +10552,7 @@
           <p:cNvPr id="3" name="Espaço Reservado para Conteúdo 2">
             <a:extLst>
               <a:ext uri="{FF2B5EF4-FFF2-40B4-BE49-F238E27FC236}">
-                <a16:creationId xmlns:a16="http://schemas.microsoft.com/office/drawing/2014/main" id="{0A29B535-C19A-4BAF-955B-A7B2EC8F3A72}"/>
+                <a16:creationId xmlns:a16="http://schemas.microsoft.com/office/drawing/2014/main" id="{EF30E35C-AA7F-4E57-8A65-652E609D43C1}"/>
               </a:ext>
             </a:extLst>
           </p:cNvPr>
@@ -10327,34 +10568,7 @@
           <a:bodyPr/>
           <a:lstStyle/>
           <a:p>
-            <a:r>
-              <a:rPr lang="pt-BR" dirty="0"/>
-              <a:t>Quando usar Data Science?</a:t>
-            </a:r>
-          </a:p>
-          <a:p>
-            <a:r>
-              <a:rPr lang="pt-BR" dirty="0"/>
-              <a:t>Quais dados usar?</a:t>
-            </a:r>
-          </a:p>
-          <a:p>
-            <a:r>
-              <a:rPr lang="pt-BR" dirty="0"/>
-              <a:t>Quantos dados usar?</a:t>
-            </a:r>
-          </a:p>
-          <a:p>
-            <a:r>
-              <a:rPr lang="pt-BR" dirty="0"/>
-              <a:t>Quais técnicas? </a:t>
-            </a:r>
-          </a:p>
-          <a:p>
-            <a:r>
-              <a:rPr lang="pt-BR" dirty="0"/>
-              <a:t>Antes de sabermos as respostas, precisamos saber o que perguntar</a:t>
-            </a:r>
+            <a:endParaRPr lang="pt-BR" dirty="0"/>
           </a:p>
         </p:txBody>
       </p:sp>
@@ -10363,7 +10577,7 @@
           <p:cNvPr id="4" name="Espaço Reservado para Número de Slide 3">
             <a:extLst>
               <a:ext uri="{FF2B5EF4-FFF2-40B4-BE49-F238E27FC236}">
-                <a16:creationId xmlns:a16="http://schemas.microsoft.com/office/drawing/2014/main" id="{BEFD7729-87F4-4291-9307-A9BFC8BCAB6F}"/>
+                <a16:creationId xmlns:a16="http://schemas.microsoft.com/office/drawing/2014/main" id="{818FF0AD-1975-4760-8379-69B55DEAE1DB}"/>
               </a:ext>
             </a:extLst>
           </p:cNvPr>
@@ -10387,10 +10601,104 @@
           </a:p>
         </p:txBody>
       </p:sp>
+      <p:pic>
+        <p:nvPicPr>
+          <p:cNvPr id="5" name="Picture 6">
+            <a:extLst>
+              <a:ext uri="{FF2B5EF4-FFF2-40B4-BE49-F238E27FC236}">
+                <a16:creationId xmlns:a16="http://schemas.microsoft.com/office/drawing/2014/main" id="{1BD54061-0954-4EFC-B7F6-1B5607BBF341}"/>
+              </a:ext>
+            </a:extLst>
+          </p:cNvPr>
+          <p:cNvPicPr>
+            <a:picLocks noChangeAspect="1" noChangeArrowheads="1"/>
+          </p:cNvPicPr>
+          <p:nvPr/>
+        </p:nvPicPr>
+        <p:blipFill>
+          <a:blip r:embed="rId2">
+            <a:extLst>
+              <a:ext uri="{28A0092B-C50C-407E-A947-70E740481C1C}">
+                <a14:useLocalDpi xmlns:a14="http://schemas.microsoft.com/office/drawing/2010/main" val="0"/>
+              </a:ext>
+            </a:extLst>
+          </a:blip>
+          <a:srcRect/>
+          <a:stretch>
+            <a:fillRect/>
+          </a:stretch>
+        </p:blipFill>
+        <p:spPr bwMode="auto">
+          <a:xfrm>
+            <a:off x="2524960" y="2922715"/>
+            <a:ext cx="1874755" cy="1452888"/>
+          </a:xfrm>
+          <a:prstGeom prst="rect">
+            <a:avLst/>
+          </a:prstGeom>
+          <a:noFill/>
+          <a:extLst>
+            <a:ext uri="{909E8E84-426E-40DD-AFC4-6F175D3DCCD1}">
+              <a14:hiddenFill xmlns:a14="http://schemas.microsoft.com/office/drawing/2010/main">
+                <a:solidFill>
+                  <a:srgbClr val="FFFFFF"/>
+                </a:solidFill>
+              </a14:hiddenFill>
+            </a:ext>
+          </a:extLst>
+        </p:spPr>
+      </p:pic>
+      <p:pic>
+        <p:nvPicPr>
+          <p:cNvPr id="6" name="Picture 8" descr="RStudio Logo Usage Guidelines - RStudio">
+            <a:extLst>
+              <a:ext uri="{FF2B5EF4-FFF2-40B4-BE49-F238E27FC236}">
+                <a16:creationId xmlns:a16="http://schemas.microsoft.com/office/drawing/2014/main" id="{5A72BB43-A410-43A1-9CA6-740293FF3766}"/>
+              </a:ext>
+            </a:extLst>
+          </p:cNvPr>
+          <p:cNvPicPr>
+            <a:picLocks noChangeAspect="1" noChangeArrowheads="1"/>
+          </p:cNvPicPr>
+          <p:nvPr/>
+        </p:nvPicPr>
+        <p:blipFill>
+          <a:blip r:embed="rId3">
+            <a:extLst>
+              <a:ext uri="{28A0092B-C50C-407E-A947-70E740481C1C}">
+                <a14:useLocalDpi xmlns:a14="http://schemas.microsoft.com/office/drawing/2010/main" val="0"/>
+              </a:ext>
+            </a:extLst>
+          </a:blip>
+          <a:srcRect/>
+          <a:stretch>
+            <a:fillRect/>
+          </a:stretch>
+        </p:blipFill>
+        <p:spPr bwMode="auto">
+          <a:xfrm>
+            <a:off x="6125412" y="3230883"/>
+            <a:ext cx="3333750" cy="1170719"/>
+          </a:xfrm>
+          <a:prstGeom prst="rect">
+            <a:avLst/>
+          </a:prstGeom>
+          <a:noFill/>
+          <a:extLst>
+            <a:ext uri="{909E8E84-426E-40DD-AFC4-6F175D3DCCD1}">
+              <a14:hiddenFill xmlns:a14="http://schemas.microsoft.com/office/drawing/2010/main">
+                <a:solidFill>
+                  <a:srgbClr val="FFFFFF"/>
+                </a:solidFill>
+              </a14:hiddenFill>
+            </a:ext>
+          </a:extLst>
+        </p:spPr>
+      </p:pic>
     </p:spTree>
     <p:extLst>
       <p:ext uri="{BB962C8B-B14F-4D97-AF65-F5344CB8AC3E}">
-        <p14:creationId xmlns:p14="http://schemas.microsoft.com/office/powerpoint/2010/main" val="1995631975"/>
+        <p14:creationId xmlns:p14="http://schemas.microsoft.com/office/powerpoint/2010/main" val="1433006389"/>
       </p:ext>
     </p:extLst>
   </p:cSld>
@@ -10422,7 +10730,7 @@
           <p:cNvPr id="2" name="Título 1">
             <a:extLst>
               <a:ext uri="{FF2B5EF4-FFF2-40B4-BE49-F238E27FC236}">
-                <a16:creationId xmlns:a16="http://schemas.microsoft.com/office/drawing/2014/main" id="{5DCA7877-E512-4751-9742-31ECCC91F589}"/>
+                <a16:creationId xmlns:a16="http://schemas.microsoft.com/office/drawing/2014/main" id="{91FB60FF-936A-4A17-B38E-3F62663EFFC2}"/>
               </a:ext>
             </a:extLst>
           </p:cNvPr>
@@ -10440,7 +10748,7 @@
           <a:p>
             <a:r>
               <a:rPr lang="pt-BR" dirty="0"/>
-              <a:t>Links Úteis</a:t>
+              <a:t>Desafios</a:t>
             </a:r>
           </a:p>
         </p:txBody>
@@ -10450,7 +10758,7 @@
           <p:cNvPr id="3" name="Espaço Reservado para Conteúdo 2">
             <a:extLst>
               <a:ext uri="{FF2B5EF4-FFF2-40B4-BE49-F238E27FC236}">
-                <a16:creationId xmlns:a16="http://schemas.microsoft.com/office/drawing/2014/main" id="{497E3B74-867C-4041-8C93-051E539F8576}"/>
+                <a16:creationId xmlns:a16="http://schemas.microsoft.com/office/drawing/2014/main" id="{0A29B535-C19A-4BAF-955B-A7B2EC8F3A72}"/>
               </a:ext>
             </a:extLst>
           </p:cNvPr>
@@ -10463,128 +10771,36 @@
         </p:nvSpPr>
         <p:spPr/>
         <p:txBody>
-          <a:bodyPr>
-            <a:normAutofit/>
-          </a:bodyPr>
+          <a:bodyPr/>
           <a:lstStyle/>
           <a:p>
             <a:r>
               <a:rPr lang="pt-BR" dirty="0"/>
-              <a:t>R: </a:t>
-            </a:r>
-            <a:r>
-              <a:rPr lang="pt-BR" dirty="0">
-                <a:hlinkClick r:id="rId2"/>
-              </a:rPr>
-              <a:t>https://cran.r-project.org/</a:t>
-            </a:r>
-            <a:r>
-              <a:rPr lang="pt-BR" dirty="0"/>
-              <a:t> </a:t>
-            </a:r>
-          </a:p>
-          <a:p>
-            <a:r>
-              <a:rPr lang="pt-BR" dirty="0" err="1"/>
-              <a:t>RStudio</a:t>
-            </a:r>
-            <a:r>
-              <a:rPr lang="pt-BR" dirty="0"/>
-              <a:t>: </a:t>
-            </a:r>
-            <a:r>
-              <a:rPr lang="pt-BR" dirty="0">
-                <a:hlinkClick r:id="rId3"/>
-              </a:rPr>
-              <a:t>https://rstudio.com/products/rstudio/download/</a:t>
-            </a:r>
-            <a:r>
-              <a:rPr lang="pt-BR" dirty="0"/>
-              <a:t> </a:t>
-            </a:r>
-          </a:p>
-          <a:p>
-            <a:r>
-              <a:rPr lang="pt-BR" dirty="0"/>
-              <a:t>Tutorial R: </a:t>
-            </a:r>
-            <a:r>
-              <a:rPr lang="pt-BR" dirty="0">
-                <a:hlinkClick r:id="rId4"/>
-              </a:rPr>
-              <a:t>https://material.curso-r.com/</a:t>
-            </a:r>
-            <a:r>
-              <a:rPr lang="pt-BR" dirty="0"/>
-              <a:t> </a:t>
-            </a:r>
-          </a:p>
-          <a:p>
-            <a:r>
-              <a:rPr lang="pt-BR" dirty="0"/>
-              <a:t>Pacotes: </a:t>
-            </a:r>
-            <a:r>
-              <a:rPr lang="pt-BR" dirty="0">
-                <a:hlinkClick r:id="rId5"/>
-              </a:rPr>
-              <a:t>https://cran.r-project.org/web/views/</a:t>
-            </a:r>
-            <a:r>
-              <a:rPr lang="pt-BR" dirty="0"/>
-              <a:t> </a:t>
-            </a:r>
-          </a:p>
-          <a:p>
-            <a:r>
-              <a:rPr lang="pt-BR" dirty="0" err="1"/>
-              <a:t>Kaggle</a:t>
-            </a:r>
-            <a:r>
-              <a:rPr lang="pt-BR" dirty="0"/>
-              <a:t>: </a:t>
-            </a:r>
-            <a:r>
-              <a:rPr lang="pt-BR" dirty="0">
-                <a:hlinkClick r:id="rId6"/>
-              </a:rPr>
-              <a:t>https://www.kaggle.com/</a:t>
-            </a:r>
-            <a:r>
-              <a:rPr lang="pt-BR" dirty="0"/>
-              <a:t> </a:t>
-            </a:r>
-          </a:p>
-          <a:p>
-            <a:r>
-              <a:rPr lang="pt-BR" dirty="0"/>
-              <a:t>Exemplo: </a:t>
-            </a:r>
-            <a:r>
-              <a:rPr lang="pt-BR" dirty="0">
-                <a:hlinkClick r:id="rId7"/>
-              </a:rPr>
-              <a:t>https://www.kaggle.com/adammaus/predicting-churn-for-bank-customers</a:t>
-            </a:r>
-            <a:r>
-              <a:rPr lang="pt-BR" dirty="0"/>
-              <a:t> </a:t>
-            </a:r>
-          </a:p>
-          <a:p>
-            <a:r>
-              <a:rPr lang="pt-BR" dirty="0"/>
-              <a:t>GitHub: </a:t>
-            </a:r>
-            <a:r>
-              <a:rPr lang="pt-BR" dirty="0">
-                <a:hlinkClick r:id="rId8"/>
-              </a:rPr>
-              <a:t>https://github.com/weslleiheckler/ChurnPrediction</a:t>
-            </a:r>
-            <a:r>
-              <a:rPr lang="pt-BR" dirty="0"/>
-              <a:t> </a:t>
+              <a:t>Quando usar Data Science?</a:t>
+            </a:r>
+          </a:p>
+          <a:p>
+            <a:r>
+              <a:rPr lang="pt-BR" dirty="0"/>
+              <a:t>Quais dados usar?</a:t>
+            </a:r>
+          </a:p>
+          <a:p>
+            <a:r>
+              <a:rPr lang="pt-BR" dirty="0"/>
+              <a:t>Quantos dados usar?</a:t>
+            </a:r>
+          </a:p>
+          <a:p>
+            <a:r>
+              <a:rPr lang="pt-BR" dirty="0"/>
+              <a:t>Quais técnicas? </a:t>
+            </a:r>
+          </a:p>
+          <a:p>
+            <a:r>
+              <a:rPr lang="pt-BR" dirty="0"/>
+              <a:t>Antes de sabermos as respostas, precisamos saber o que perguntar</a:t>
             </a:r>
           </a:p>
         </p:txBody>
@@ -10594,7 +10810,7 @@
           <p:cNvPr id="4" name="Espaço Reservado para Número de Slide 3">
             <a:extLst>
               <a:ext uri="{FF2B5EF4-FFF2-40B4-BE49-F238E27FC236}">
-                <a16:creationId xmlns:a16="http://schemas.microsoft.com/office/drawing/2014/main" id="{596CAA22-5B32-41E7-AAC9-52398813F7B8}"/>
+                <a16:creationId xmlns:a16="http://schemas.microsoft.com/office/drawing/2014/main" id="{BEFD7729-87F4-4291-9307-A9BFC8BCAB6F}"/>
               </a:ext>
             </a:extLst>
           </p:cNvPr>
@@ -10621,7 +10837,7 @@
     </p:spTree>
     <p:extLst>
       <p:ext uri="{BB962C8B-B14F-4D97-AF65-F5344CB8AC3E}">
-        <p14:creationId xmlns:p14="http://schemas.microsoft.com/office/powerpoint/2010/main" val="3243003653"/>
+        <p14:creationId xmlns:p14="http://schemas.microsoft.com/office/powerpoint/2010/main" val="1995631975"/>
       </p:ext>
     </p:extLst>
   </p:cSld>
@@ -10653,7 +10869,7 @@
           <p:cNvPr id="2" name="Título 1">
             <a:extLst>
               <a:ext uri="{FF2B5EF4-FFF2-40B4-BE49-F238E27FC236}">
-                <a16:creationId xmlns:a16="http://schemas.microsoft.com/office/drawing/2014/main" id="{C55FC759-1F04-4799-8C18-D2A7D35EDDEE}"/>
+                <a16:creationId xmlns:a16="http://schemas.microsoft.com/office/drawing/2014/main" id="{8D7B1376-A4D8-4FA7-BD53-98674B3F85A3}"/>
               </a:ext>
             </a:extLst>
           </p:cNvPr>
@@ -10671,7 +10887,7 @@
           <a:p>
             <a:r>
               <a:rPr lang="pt-BR" dirty="0"/>
-              <a:t>Referências</a:t>
+              <a:t>Qual é o limite?</a:t>
             </a:r>
           </a:p>
         </p:txBody>
@@ -10681,7 +10897,7 @@
           <p:cNvPr id="3" name="Espaço Reservado para Conteúdo 2">
             <a:extLst>
               <a:ext uri="{FF2B5EF4-FFF2-40B4-BE49-F238E27FC236}">
-                <a16:creationId xmlns:a16="http://schemas.microsoft.com/office/drawing/2014/main" id="{1AA23A8B-D1C4-4BD4-A929-63DB3F90B6E5}"/>
+                <a16:creationId xmlns:a16="http://schemas.microsoft.com/office/drawing/2014/main" id="{6295A7C4-B980-42BA-BF55-99F047387493}"/>
               </a:ext>
             </a:extLst>
           </p:cNvPr>
@@ -10697,158 +10913,6 @@
           <a:bodyPr/>
           <a:lstStyle/>
           <a:p>
-            <a:r>
-              <a:rPr lang="en-US" dirty="0" err="1"/>
-              <a:t>Alpaydin</a:t>
-            </a:r>
-            <a:r>
-              <a:rPr lang="en-US" dirty="0"/>
-              <a:t>, E. (2010). Introduction to Machine Learning (2°). The MIT Press. </a:t>
-            </a:r>
-            <a:r>
-              <a:rPr lang="en-US" dirty="0">
-                <a:hlinkClick r:id="rId2"/>
-              </a:rPr>
-              <a:t>https://doi.org/10.1016/j.neuroimage.2010.11.004</a:t>
-            </a:r>
-            <a:endParaRPr lang="en-US" dirty="0"/>
-          </a:p>
-          <a:p>
-            <a:r>
-              <a:rPr lang="pt-BR" dirty="0" err="1"/>
-              <a:t>Hadley</a:t>
-            </a:r>
-            <a:r>
-              <a:rPr lang="pt-BR" dirty="0"/>
-              <a:t> Wickham </a:t>
-            </a:r>
-            <a:r>
-              <a:rPr lang="pt-BR" dirty="0" err="1"/>
-              <a:t>and</a:t>
-            </a:r>
-            <a:r>
-              <a:rPr lang="pt-BR" dirty="0"/>
-              <a:t> Garrett </a:t>
-            </a:r>
-            <a:r>
-              <a:rPr lang="pt-BR" dirty="0" err="1"/>
-              <a:t>Grolemund</a:t>
-            </a:r>
-            <a:r>
-              <a:rPr lang="pt-BR" dirty="0"/>
-              <a:t>. 2017. R for Data Science: </a:t>
-            </a:r>
-            <a:r>
-              <a:rPr lang="pt-BR" dirty="0" err="1"/>
-              <a:t>Import</a:t>
-            </a:r>
-            <a:r>
-              <a:rPr lang="pt-BR" dirty="0"/>
-              <a:t>, </a:t>
-            </a:r>
-            <a:r>
-              <a:rPr lang="pt-BR" dirty="0" err="1"/>
-              <a:t>Tidy</a:t>
-            </a:r>
-            <a:r>
-              <a:rPr lang="pt-BR" dirty="0"/>
-              <a:t>, </a:t>
-            </a:r>
-            <a:r>
-              <a:rPr lang="pt-BR" dirty="0" err="1"/>
-              <a:t>Transform</a:t>
-            </a:r>
-            <a:r>
-              <a:rPr lang="pt-BR" dirty="0"/>
-              <a:t>, Visualize, </a:t>
-            </a:r>
-            <a:r>
-              <a:rPr lang="pt-BR" dirty="0" err="1"/>
-              <a:t>and</a:t>
-            </a:r>
-            <a:r>
-              <a:rPr lang="pt-BR" dirty="0"/>
-              <a:t> </a:t>
-            </a:r>
-            <a:r>
-              <a:rPr lang="pt-BR" dirty="0" err="1"/>
-              <a:t>Model</a:t>
-            </a:r>
-            <a:r>
-              <a:rPr lang="pt-BR" dirty="0"/>
-              <a:t> Data (1st. ed.). </a:t>
-            </a:r>
-            <a:r>
-              <a:rPr lang="pt-BR" dirty="0" err="1"/>
-              <a:t>O'Reilly</a:t>
-            </a:r>
-            <a:r>
-              <a:rPr lang="pt-BR" dirty="0"/>
-              <a:t> Media, Inc. </a:t>
-            </a:r>
-            <a:r>
-              <a:rPr lang="pt-BR" dirty="0">
-                <a:hlinkClick r:id="rId3"/>
-              </a:rPr>
-              <a:t>https://r4ds.had.co.nz/index.html</a:t>
-            </a:r>
-            <a:r>
-              <a:rPr lang="pt-BR" dirty="0"/>
-              <a:t> </a:t>
-            </a:r>
-          </a:p>
-          <a:p>
-            <a:r>
-              <a:rPr lang="en-US" dirty="0"/>
-              <a:t>Mitchell, T. M. (2006). The Discipline of Machine Learning. </a:t>
-            </a:r>
-            <a:r>
-              <a:rPr lang="en-US" dirty="0">
-                <a:hlinkClick r:id="rId4"/>
-              </a:rPr>
-              <a:t>https://doi.org/10.1080/026404199365326</a:t>
-            </a:r>
-            <a:endParaRPr lang="en-US" dirty="0"/>
-          </a:p>
-          <a:p>
-            <a:r>
-              <a:rPr lang="pt-BR" dirty="0"/>
-              <a:t>Tan, </a:t>
-            </a:r>
-            <a:r>
-              <a:rPr lang="pt-BR" dirty="0" err="1"/>
-              <a:t>Pang</a:t>
-            </a:r>
-            <a:r>
-              <a:rPr lang="pt-BR" dirty="0"/>
-              <a:t>-Ning; </a:t>
-            </a:r>
-            <a:r>
-              <a:rPr lang="pt-BR" dirty="0" err="1"/>
-              <a:t>Steinbach</a:t>
-            </a:r>
-            <a:r>
-              <a:rPr lang="pt-BR" dirty="0"/>
-              <a:t>, Michael; </a:t>
-            </a:r>
-            <a:r>
-              <a:rPr lang="pt-BR" dirty="0" err="1"/>
-              <a:t>Kumar</a:t>
-            </a:r>
-            <a:r>
-              <a:rPr lang="pt-BR" dirty="0"/>
-              <a:t>, </a:t>
-            </a:r>
-            <a:r>
-              <a:rPr lang="pt-BR" dirty="0" err="1"/>
-              <a:t>Vipin</a:t>
-            </a:r>
-            <a:r>
-              <a:rPr lang="pt-BR" dirty="0"/>
-              <a:t>. Introdução ao Data Mining. Editora Ciência Moderna. Rio de Janeiro. 2009.</a:t>
-            </a:r>
-          </a:p>
-          <a:p>
             <a:endParaRPr lang="pt-BR" dirty="0"/>
           </a:p>
         </p:txBody>
@@ -10858,7 +10922,7 @@
           <p:cNvPr id="4" name="Espaço Reservado para Número de Slide 3">
             <a:extLst>
               <a:ext uri="{FF2B5EF4-FFF2-40B4-BE49-F238E27FC236}">
-                <a16:creationId xmlns:a16="http://schemas.microsoft.com/office/drawing/2014/main" id="{A69E9536-E820-4E86-8BF7-02C9F3DC7198}"/>
+                <a16:creationId xmlns:a16="http://schemas.microsoft.com/office/drawing/2014/main" id="{E65D27A8-9E87-4111-9F0C-302138B15E46}"/>
               </a:ext>
             </a:extLst>
           </p:cNvPr>
@@ -10882,10 +10946,104 @@
           </a:p>
         </p:txBody>
       </p:sp>
+      <p:pic>
+        <p:nvPicPr>
+          <p:cNvPr id="3074" name="Picture 2" descr="Cambridge Analytica - Wikipedia">
+            <a:extLst>
+              <a:ext uri="{FF2B5EF4-FFF2-40B4-BE49-F238E27FC236}">
+                <a16:creationId xmlns:a16="http://schemas.microsoft.com/office/drawing/2014/main" id="{8557E90A-8632-4332-99B9-B2F9346AD2E5}"/>
+              </a:ext>
+            </a:extLst>
+          </p:cNvPr>
+          <p:cNvPicPr>
+            <a:picLocks noChangeAspect="1" noChangeArrowheads="1"/>
+          </p:cNvPicPr>
+          <p:nvPr/>
+        </p:nvPicPr>
+        <p:blipFill>
+          <a:blip r:embed="rId2">
+            <a:extLst>
+              <a:ext uri="{28A0092B-C50C-407E-A947-70E740481C1C}">
+                <a14:useLocalDpi xmlns:a14="http://schemas.microsoft.com/office/drawing/2010/main" val="0"/>
+              </a:ext>
+            </a:extLst>
+          </a:blip>
+          <a:srcRect/>
+          <a:stretch>
+            <a:fillRect/>
+          </a:stretch>
+        </p:blipFill>
+        <p:spPr bwMode="auto">
+          <a:xfrm>
+            <a:off x="1801708" y="2323748"/>
+            <a:ext cx="2827326" cy="2730617"/>
+          </a:xfrm>
+          <a:prstGeom prst="rect">
+            <a:avLst/>
+          </a:prstGeom>
+          <a:noFill/>
+          <a:extLst>
+            <a:ext uri="{909E8E84-426E-40DD-AFC4-6F175D3DCCD1}">
+              <a14:hiddenFill xmlns:a14="http://schemas.microsoft.com/office/drawing/2010/main">
+                <a:solidFill>
+                  <a:srgbClr val="FFFFFF"/>
+                </a:solidFill>
+              </a14:hiddenFill>
+            </a:ext>
+          </a:extLst>
+        </p:spPr>
+      </p:pic>
+      <p:pic>
+        <p:nvPicPr>
+          <p:cNvPr id="3076" name="Picture 4" descr="The Great Hack | Netflix Official Site">
+            <a:extLst>
+              <a:ext uri="{FF2B5EF4-FFF2-40B4-BE49-F238E27FC236}">
+                <a16:creationId xmlns:a16="http://schemas.microsoft.com/office/drawing/2014/main" id="{4D9AF24A-A572-4C7D-AE34-3D63B1488A45}"/>
+              </a:ext>
+            </a:extLst>
+          </p:cNvPr>
+          <p:cNvPicPr>
+            <a:picLocks noChangeAspect="1" noChangeArrowheads="1"/>
+          </p:cNvPicPr>
+          <p:nvPr/>
+        </p:nvPicPr>
+        <p:blipFill>
+          <a:blip r:embed="rId3">
+            <a:extLst>
+              <a:ext uri="{28A0092B-C50C-407E-A947-70E740481C1C}">
+                <a14:useLocalDpi xmlns:a14="http://schemas.microsoft.com/office/drawing/2010/main" val="0"/>
+              </a:ext>
+            </a:extLst>
+          </a:blip>
+          <a:srcRect/>
+          <a:stretch>
+            <a:fillRect/>
+          </a:stretch>
+        </p:blipFill>
+        <p:spPr bwMode="auto">
+          <a:xfrm>
+            <a:off x="5746459" y="2323748"/>
+            <a:ext cx="4876800" cy="2743200"/>
+          </a:xfrm>
+          <a:prstGeom prst="rect">
+            <a:avLst/>
+          </a:prstGeom>
+          <a:noFill/>
+          <a:extLst>
+            <a:ext uri="{909E8E84-426E-40DD-AFC4-6F175D3DCCD1}">
+              <a14:hiddenFill xmlns:a14="http://schemas.microsoft.com/office/drawing/2010/main">
+                <a:solidFill>
+                  <a:srgbClr val="FFFFFF"/>
+                </a:solidFill>
+              </a14:hiddenFill>
+            </a:ext>
+          </a:extLst>
+        </p:spPr>
+      </p:pic>
     </p:spTree>
     <p:extLst>
       <p:ext uri="{BB962C8B-B14F-4D97-AF65-F5344CB8AC3E}">
-        <p14:creationId xmlns:p14="http://schemas.microsoft.com/office/powerpoint/2010/main" val="3659143944"/>
+        <p14:creationId xmlns:p14="http://schemas.microsoft.com/office/powerpoint/2010/main" val="3563648506"/>
       </p:ext>
     </p:extLst>
   </p:cSld>
@@ -10917,7 +11075,7 @@
           <p:cNvPr id="2" name="Título 1">
             <a:extLst>
               <a:ext uri="{FF2B5EF4-FFF2-40B4-BE49-F238E27FC236}">
-                <a16:creationId xmlns:a16="http://schemas.microsoft.com/office/drawing/2014/main" id="{217F090C-B1D4-48FF-B35D-FACB2A4EC7F1}"/>
+                <a16:creationId xmlns:a16="http://schemas.microsoft.com/office/drawing/2014/main" id="{5DCA7877-E512-4751-9742-31ECCC91F589}"/>
               </a:ext>
             </a:extLst>
           </p:cNvPr>
@@ -10933,7 +11091,10 @@
           <a:bodyPr/>
           <a:lstStyle/>
           <a:p>
-            <a:endParaRPr lang="pt-BR"/>
+            <a:r>
+              <a:rPr lang="pt-BR" dirty="0"/>
+              <a:t>Links Úteis</a:t>
+            </a:r>
           </a:p>
         </p:txBody>
       </p:sp>
@@ -10942,7 +11103,7 @@
           <p:cNvPr id="3" name="Espaço Reservado para Conteúdo 2">
             <a:extLst>
               <a:ext uri="{FF2B5EF4-FFF2-40B4-BE49-F238E27FC236}">
-                <a16:creationId xmlns:a16="http://schemas.microsoft.com/office/drawing/2014/main" id="{A594B264-6A9F-4F52-804A-CBC424B85AA0}"/>
+                <a16:creationId xmlns:a16="http://schemas.microsoft.com/office/drawing/2014/main" id="{497E3B74-867C-4041-8C93-051E539F8576}"/>
               </a:ext>
             </a:extLst>
           </p:cNvPr>
@@ -10953,18 +11114,510 @@
             <p:ph idx="1"/>
           </p:nvPr>
         </p:nvSpPr>
-        <p:spPr>
-          <a:xfrm>
-            <a:off x="838200" y="3063874"/>
-            <a:ext cx="10515600" cy="1116367"/>
-          </a:xfrm>
-        </p:spPr>
+        <p:spPr/>
         <p:txBody>
           <a:bodyPr>
             <a:normAutofit/>
           </a:bodyPr>
           <a:lstStyle/>
           <a:p>
+            <a:r>
+              <a:rPr lang="pt-BR" dirty="0"/>
+              <a:t>R: </a:t>
+            </a:r>
+            <a:r>
+              <a:rPr lang="pt-BR" dirty="0">
+                <a:hlinkClick r:id="rId2"/>
+              </a:rPr>
+              <a:t>https://cran.r-project.org/</a:t>
+            </a:r>
+            <a:r>
+              <a:rPr lang="pt-BR" dirty="0"/>
+              <a:t> </a:t>
+            </a:r>
+          </a:p>
+          <a:p>
+            <a:r>
+              <a:rPr lang="pt-BR" dirty="0" err="1"/>
+              <a:t>RStudio</a:t>
+            </a:r>
+            <a:r>
+              <a:rPr lang="pt-BR" dirty="0"/>
+              <a:t>: </a:t>
+            </a:r>
+            <a:r>
+              <a:rPr lang="pt-BR" dirty="0">
+                <a:hlinkClick r:id="rId3"/>
+              </a:rPr>
+              <a:t>https://rstudio.com/products/rstudio/download/</a:t>
+            </a:r>
+            <a:r>
+              <a:rPr lang="pt-BR" dirty="0"/>
+              <a:t> </a:t>
+            </a:r>
+          </a:p>
+          <a:p>
+            <a:r>
+              <a:rPr lang="pt-BR" dirty="0"/>
+              <a:t>Tutorial R: </a:t>
+            </a:r>
+            <a:r>
+              <a:rPr lang="pt-BR" dirty="0">
+                <a:hlinkClick r:id="rId4"/>
+              </a:rPr>
+              <a:t>https://material.curso-r.com/</a:t>
+            </a:r>
+            <a:r>
+              <a:rPr lang="pt-BR" dirty="0"/>
+              <a:t> </a:t>
+            </a:r>
+          </a:p>
+          <a:p>
+            <a:r>
+              <a:rPr lang="pt-BR" dirty="0"/>
+              <a:t>Pacotes: </a:t>
+            </a:r>
+            <a:r>
+              <a:rPr lang="pt-BR" dirty="0">
+                <a:hlinkClick r:id="rId5"/>
+              </a:rPr>
+              <a:t>https://cran.r-project.org/web/views/</a:t>
+            </a:r>
+            <a:r>
+              <a:rPr lang="pt-BR" dirty="0"/>
+              <a:t> </a:t>
+            </a:r>
+          </a:p>
+          <a:p>
+            <a:r>
+              <a:rPr lang="pt-BR" dirty="0" err="1"/>
+              <a:t>Kaggle</a:t>
+            </a:r>
+            <a:r>
+              <a:rPr lang="pt-BR" dirty="0"/>
+              <a:t>: </a:t>
+            </a:r>
+            <a:r>
+              <a:rPr lang="pt-BR" dirty="0">
+                <a:hlinkClick r:id="rId6"/>
+              </a:rPr>
+              <a:t>https://www.kaggle.com/</a:t>
+            </a:r>
+            <a:r>
+              <a:rPr lang="pt-BR" dirty="0"/>
+              <a:t> </a:t>
+            </a:r>
+          </a:p>
+          <a:p>
+            <a:r>
+              <a:rPr lang="pt-BR" dirty="0"/>
+              <a:t>Exemplo: </a:t>
+            </a:r>
+            <a:r>
+              <a:rPr lang="pt-BR" dirty="0">
+                <a:hlinkClick r:id="rId7"/>
+              </a:rPr>
+              <a:t>https://www.kaggle.com/adammaus/predicting-churn-for-bank-customers</a:t>
+            </a:r>
+            <a:r>
+              <a:rPr lang="pt-BR" dirty="0"/>
+              <a:t> </a:t>
+            </a:r>
+          </a:p>
+          <a:p>
+            <a:r>
+              <a:rPr lang="pt-BR" dirty="0"/>
+              <a:t>GitHub: </a:t>
+            </a:r>
+            <a:r>
+              <a:rPr lang="pt-BR" dirty="0">
+                <a:hlinkClick r:id="rId8"/>
+              </a:rPr>
+              <a:t>https://github.com/weslleiheckler/ChurnPrediction</a:t>
+            </a:r>
+            <a:r>
+              <a:rPr lang="pt-BR" dirty="0"/>
+              <a:t> </a:t>
+            </a:r>
+          </a:p>
+        </p:txBody>
+      </p:sp>
+      <p:sp>
+        <p:nvSpPr>
+          <p:cNvPr id="4" name="Espaço Reservado para Número de Slide 3">
+            <a:extLst>
+              <a:ext uri="{FF2B5EF4-FFF2-40B4-BE49-F238E27FC236}">
+                <a16:creationId xmlns:a16="http://schemas.microsoft.com/office/drawing/2014/main" id="{596CAA22-5B32-41E7-AAC9-52398813F7B8}"/>
+              </a:ext>
+            </a:extLst>
+          </p:cNvPr>
+          <p:cNvSpPr>
+            <a:spLocks noGrp="1"/>
+          </p:cNvSpPr>
+          <p:nvPr>
+            <p:ph type="sldNum" sz="quarter" idx="12"/>
+          </p:nvPr>
+        </p:nvSpPr>
+        <p:spPr/>
+        <p:txBody>
+          <a:bodyPr/>
+          <a:lstStyle/>
+          <a:p>
+            <a:fld id="{BFAA6DF7-C204-4645-883D-6118CE896862}" type="slidenum">
+              <a:rPr lang="pt-BR" smtClean="0"/>
+              <a:t>15</a:t>
+            </a:fld>
+            <a:endParaRPr lang="pt-BR"/>
+          </a:p>
+        </p:txBody>
+      </p:sp>
+    </p:spTree>
+    <p:extLst>
+      <p:ext uri="{BB962C8B-B14F-4D97-AF65-F5344CB8AC3E}">
+        <p14:creationId xmlns:p14="http://schemas.microsoft.com/office/powerpoint/2010/main" val="3243003653"/>
+      </p:ext>
+    </p:extLst>
+  </p:cSld>
+  <p:clrMapOvr>
+    <a:masterClrMapping/>
+  </p:clrMapOvr>
+</p:sld>
+</file>
+
+<file path=ppt/slides/slide16.xml><?xml version="1.0" encoding="utf-8"?>
+<p:sld xmlns:a="http://schemas.openxmlformats.org/drawingml/2006/main" xmlns:r="http://schemas.openxmlformats.org/officeDocument/2006/relationships" xmlns:p="http://schemas.openxmlformats.org/presentationml/2006/main">
+  <p:cSld>
+    <p:spTree>
+      <p:nvGrpSpPr>
+        <p:cNvPr id="1" name=""/>
+        <p:cNvGrpSpPr/>
+        <p:nvPr/>
+      </p:nvGrpSpPr>
+      <p:grpSpPr>
+        <a:xfrm>
+          <a:off x="0" y="0"/>
+          <a:ext cx="0" cy="0"/>
+          <a:chOff x="0" y="0"/>
+          <a:chExt cx="0" cy="0"/>
+        </a:xfrm>
+      </p:grpSpPr>
+      <p:sp>
+        <p:nvSpPr>
+          <p:cNvPr id="2" name="Título 1">
+            <a:extLst>
+              <a:ext uri="{FF2B5EF4-FFF2-40B4-BE49-F238E27FC236}">
+                <a16:creationId xmlns:a16="http://schemas.microsoft.com/office/drawing/2014/main" id="{C55FC759-1F04-4799-8C18-D2A7D35EDDEE}"/>
+              </a:ext>
+            </a:extLst>
+          </p:cNvPr>
+          <p:cNvSpPr>
+            <a:spLocks noGrp="1"/>
+          </p:cNvSpPr>
+          <p:nvPr>
+            <p:ph type="title"/>
+          </p:nvPr>
+        </p:nvSpPr>
+        <p:spPr/>
+        <p:txBody>
+          <a:bodyPr/>
+          <a:lstStyle/>
+          <a:p>
+            <a:r>
+              <a:rPr lang="pt-BR" dirty="0"/>
+              <a:t>Referências</a:t>
+            </a:r>
+          </a:p>
+        </p:txBody>
+      </p:sp>
+      <p:sp>
+        <p:nvSpPr>
+          <p:cNvPr id="3" name="Espaço Reservado para Conteúdo 2">
+            <a:extLst>
+              <a:ext uri="{FF2B5EF4-FFF2-40B4-BE49-F238E27FC236}">
+                <a16:creationId xmlns:a16="http://schemas.microsoft.com/office/drawing/2014/main" id="{1AA23A8B-D1C4-4BD4-A929-63DB3F90B6E5}"/>
+              </a:ext>
+            </a:extLst>
+          </p:cNvPr>
+          <p:cNvSpPr>
+            <a:spLocks noGrp="1"/>
+          </p:cNvSpPr>
+          <p:nvPr>
+            <p:ph idx="1"/>
+          </p:nvPr>
+        </p:nvSpPr>
+        <p:spPr/>
+        <p:txBody>
+          <a:bodyPr/>
+          <a:lstStyle/>
+          <a:p>
+            <a:r>
+              <a:rPr lang="en-US" dirty="0" err="1"/>
+              <a:t>Alpaydin</a:t>
+            </a:r>
+            <a:r>
+              <a:rPr lang="en-US" dirty="0"/>
+              <a:t>, E. (2010). Introduction to Machine Learning (2°). The MIT Press. </a:t>
+            </a:r>
+            <a:r>
+              <a:rPr lang="en-US" dirty="0">
+                <a:hlinkClick r:id="rId2"/>
+              </a:rPr>
+              <a:t>https://doi.org/10.1016/j.neuroimage.2010.11.004</a:t>
+            </a:r>
+            <a:endParaRPr lang="en-US" dirty="0"/>
+          </a:p>
+          <a:p>
+            <a:r>
+              <a:rPr lang="pt-BR" dirty="0" err="1"/>
+              <a:t>Hadley</a:t>
+            </a:r>
+            <a:r>
+              <a:rPr lang="pt-BR" dirty="0"/>
+              <a:t> Wickham </a:t>
+            </a:r>
+            <a:r>
+              <a:rPr lang="pt-BR" dirty="0" err="1"/>
+              <a:t>and</a:t>
+            </a:r>
+            <a:r>
+              <a:rPr lang="pt-BR" dirty="0"/>
+              <a:t> Garrett </a:t>
+            </a:r>
+            <a:r>
+              <a:rPr lang="pt-BR" dirty="0" err="1"/>
+              <a:t>Grolemund</a:t>
+            </a:r>
+            <a:r>
+              <a:rPr lang="pt-BR" dirty="0"/>
+              <a:t>. 2017. R for Data Science: </a:t>
+            </a:r>
+            <a:r>
+              <a:rPr lang="pt-BR" dirty="0" err="1"/>
+              <a:t>Import</a:t>
+            </a:r>
+            <a:r>
+              <a:rPr lang="pt-BR" dirty="0"/>
+              <a:t>, </a:t>
+            </a:r>
+            <a:r>
+              <a:rPr lang="pt-BR" dirty="0" err="1"/>
+              <a:t>Tidy</a:t>
+            </a:r>
+            <a:r>
+              <a:rPr lang="pt-BR" dirty="0"/>
+              <a:t>, </a:t>
+            </a:r>
+            <a:r>
+              <a:rPr lang="pt-BR" dirty="0" err="1"/>
+              <a:t>Transform</a:t>
+            </a:r>
+            <a:r>
+              <a:rPr lang="pt-BR" dirty="0"/>
+              <a:t>, Visualize, </a:t>
+            </a:r>
+            <a:r>
+              <a:rPr lang="pt-BR" dirty="0" err="1"/>
+              <a:t>and</a:t>
+            </a:r>
+            <a:r>
+              <a:rPr lang="pt-BR" dirty="0"/>
+              <a:t> </a:t>
+            </a:r>
+            <a:r>
+              <a:rPr lang="pt-BR" dirty="0" err="1"/>
+              <a:t>Model</a:t>
+            </a:r>
+            <a:r>
+              <a:rPr lang="pt-BR" dirty="0"/>
+              <a:t> Data (1st. ed.). </a:t>
+            </a:r>
+            <a:r>
+              <a:rPr lang="pt-BR" dirty="0" err="1"/>
+              <a:t>O'Reilly</a:t>
+            </a:r>
+            <a:r>
+              <a:rPr lang="pt-BR" dirty="0"/>
+              <a:t> Media, Inc. </a:t>
+            </a:r>
+            <a:r>
+              <a:rPr lang="pt-BR" dirty="0">
+                <a:hlinkClick r:id="rId3"/>
+              </a:rPr>
+              <a:t>https://r4ds.had.co.nz/index.html</a:t>
+            </a:r>
+            <a:r>
+              <a:rPr lang="pt-BR" dirty="0"/>
+              <a:t> </a:t>
+            </a:r>
+          </a:p>
+          <a:p>
+            <a:r>
+              <a:rPr lang="en-US" dirty="0"/>
+              <a:t>Mitchell, T. M. (2006). The Discipline of Machine Learning. </a:t>
+            </a:r>
+            <a:r>
+              <a:rPr lang="en-US" dirty="0">
+                <a:hlinkClick r:id="rId4"/>
+              </a:rPr>
+              <a:t>https://doi.org/10.1080/026404199365326</a:t>
+            </a:r>
+            <a:endParaRPr lang="en-US" dirty="0"/>
+          </a:p>
+          <a:p>
+            <a:r>
+              <a:rPr lang="pt-BR" dirty="0"/>
+              <a:t>Tan, </a:t>
+            </a:r>
+            <a:r>
+              <a:rPr lang="pt-BR" dirty="0" err="1"/>
+              <a:t>Pang</a:t>
+            </a:r>
+            <a:r>
+              <a:rPr lang="pt-BR" dirty="0"/>
+              <a:t>-Ning; </a:t>
+            </a:r>
+            <a:r>
+              <a:rPr lang="pt-BR" dirty="0" err="1"/>
+              <a:t>Steinbach</a:t>
+            </a:r>
+            <a:r>
+              <a:rPr lang="pt-BR" dirty="0"/>
+              <a:t>, Michael; </a:t>
+            </a:r>
+            <a:r>
+              <a:rPr lang="pt-BR" dirty="0" err="1"/>
+              <a:t>Kumar</a:t>
+            </a:r>
+            <a:r>
+              <a:rPr lang="pt-BR" dirty="0"/>
+              <a:t>, </a:t>
+            </a:r>
+            <a:r>
+              <a:rPr lang="pt-BR" dirty="0" err="1"/>
+              <a:t>Vipin</a:t>
+            </a:r>
+            <a:r>
+              <a:rPr lang="pt-BR" dirty="0"/>
+              <a:t>. Introdução ao Data Mining. Editora Ciência Moderna. Rio de Janeiro. 2009.</a:t>
+            </a:r>
+          </a:p>
+          <a:p>
+            <a:endParaRPr lang="pt-BR" dirty="0"/>
+          </a:p>
+        </p:txBody>
+      </p:sp>
+      <p:sp>
+        <p:nvSpPr>
+          <p:cNvPr id="4" name="Espaço Reservado para Número de Slide 3">
+            <a:extLst>
+              <a:ext uri="{FF2B5EF4-FFF2-40B4-BE49-F238E27FC236}">
+                <a16:creationId xmlns:a16="http://schemas.microsoft.com/office/drawing/2014/main" id="{A69E9536-E820-4E86-8BF7-02C9F3DC7198}"/>
+              </a:ext>
+            </a:extLst>
+          </p:cNvPr>
+          <p:cNvSpPr>
+            <a:spLocks noGrp="1"/>
+          </p:cNvSpPr>
+          <p:nvPr>
+            <p:ph type="sldNum" sz="quarter" idx="12"/>
+          </p:nvPr>
+        </p:nvSpPr>
+        <p:spPr/>
+        <p:txBody>
+          <a:bodyPr/>
+          <a:lstStyle/>
+          <a:p>
+            <a:fld id="{BFAA6DF7-C204-4645-883D-6118CE896862}" type="slidenum">
+              <a:rPr lang="pt-BR" smtClean="0"/>
+              <a:t>16</a:t>
+            </a:fld>
+            <a:endParaRPr lang="pt-BR"/>
+          </a:p>
+        </p:txBody>
+      </p:sp>
+    </p:spTree>
+    <p:extLst>
+      <p:ext uri="{BB962C8B-B14F-4D97-AF65-F5344CB8AC3E}">
+        <p14:creationId xmlns:p14="http://schemas.microsoft.com/office/powerpoint/2010/main" val="3659143944"/>
+      </p:ext>
+    </p:extLst>
+  </p:cSld>
+  <p:clrMapOvr>
+    <a:masterClrMapping/>
+  </p:clrMapOvr>
+</p:sld>
+</file>
+
+<file path=ppt/slides/slide17.xml><?xml version="1.0" encoding="utf-8"?>
+<p:sld xmlns:a="http://schemas.openxmlformats.org/drawingml/2006/main" xmlns:r="http://schemas.openxmlformats.org/officeDocument/2006/relationships" xmlns:p="http://schemas.openxmlformats.org/presentationml/2006/main">
+  <p:cSld>
+    <p:spTree>
+      <p:nvGrpSpPr>
+        <p:cNvPr id="1" name=""/>
+        <p:cNvGrpSpPr/>
+        <p:nvPr/>
+      </p:nvGrpSpPr>
+      <p:grpSpPr>
+        <a:xfrm>
+          <a:off x="0" y="0"/>
+          <a:ext cx="0" cy="0"/>
+          <a:chOff x="0" y="0"/>
+          <a:chExt cx="0" cy="0"/>
+        </a:xfrm>
+      </p:grpSpPr>
+      <p:sp>
+        <p:nvSpPr>
+          <p:cNvPr id="2" name="Título 1">
+            <a:extLst>
+              <a:ext uri="{FF2B5EF4-FFF2-40B4-BE49-F238E27FC236}">
+                <a16:creationId xmlns:a16="http://schemas.microsoft.com/office/drawing/2014/main" id="{217F090C-B1D4-48FF-B35D-FACB2A4EC7F1}"/>
+              </a:ext>
+            </a:extLst>
+          </p:cNvPr>
+          <p:cNvSpPr>
+            <a:spLocks noGrp="1"/>
+          </p:cNvSpPr>
+          <p:nvPr>
+            <p:ph type="title"/>
+          </p:nvPr>
+        </p:nvSpPr>
+        <p:spPr/>
+        <p:txBody>
+          <a:bodyPr/>
+          <a:lstStyle/>
+          <a:p>
+            <a:endParaRPr lang="pt-BR"/>
+          </a:p>
+        </p:txBody>
+      </p:sp>
+      <p:sp>
+        <p:nvSpPr>
+          <p:cNvPr id="3" name="Espaço Reservado para Conteúdo 2">
+            <a:extLst>
+              <a:ext uri="{FF2B5EF4-FFF2-40B4-BE49-F238E27FC236}">
+                <a16:creationId xmlns:a16="http://schemas.microsoft.com/office/drawing/2014/main" id="{A594B264-6A9F-4F52-804A-CBC424B85AA0}"/>
+              </a:ext>
+            </a:extLst>
+          </p:cNvPr>
+          <p:cNvSpPr>
+            <a:spLocks noGrp="1"/>
+          </p:cNvSpPr>
+          <p:nvPr>
+            <p:ph idx="1"/>
+          </p:nvPr>
+        </p:nvSpPr>
+        <p:spPr>
+          <a:xfrm>
+            <a:off x="838200" y="3063874"/>
+            <a:ext cx="10515600" cy="2342627"/>
+          </a:xfrm>
+        </p:spPr>
+        <p:txBody>
+          <a:bodyPr>
+            <a:normAutofit/>
+          </a:bodyPr>
+          <a:lstStyle/>
+          <a:p>
             <a:pPr marL="0" indent="0" algn="ctr">
               <a:buNone/>
             </a:pPr>
@@ -10973,6 +11626,21 @@
               <a:t>OBRIGADO!</a:t>
             </a:r>
           </a:p>
+          <a:p>
+            <a:pPr marL="0" indent="0" algn="ctr">
+              <a:buNone/>
+            </a:pPr>
+            <a:endParaRPr lang="pt-BR" sz="5800" dirty="0"/>
+          </a:p>
+          <a:p>
+            <a:pPr marL="0" indent="0" algn="ctr">
+              <a:buNone/>
+            </a:pPr>
+            <a:r>
+              <a:rPr lang="pt-BR" dirty="0"/>
+              <a:t>wesllei.heckler@cigam.com.br</a:t>
+            </a:r>
+          </a:p>
         </p:txBody>
       </p:sp>
       <p:sp>
@@ -10998,7 +11666,7 @@
           <a:p>
             <a:fld id="{BFAA6DF7-C204-4645-883D-6118CE896862}" type="slidenum">
               <a:rPr lang="pt-BR" smtClean="0"/>
-              <a:t>15</a:t>
+              <a:t>17</a:t>
             </a:fld>
             <a:endParaRPr lang="pt-BR"/>
           </a:p>
@@ -11017,7 +11685,7 @@
 </p:sld>
 </file>
 
-<file path=ppt/slides/slide16.xml><?xml version="1.0" encoding="utf-8"?>
+<file path=ppt/slides/slide18.xml><?xml version="1.0" encoding="utf-8"?>
 <p:sld xmlns:a="http://schemas.openxmlformats.org/drawingml/2006/main" xmlns:r="http://schemas.openxmlformats.org/officeDocument/2006/relationships" xmlns:p="http://schemas.openxmlformats.org/presentationml/2006/main">
   <p:cSld>
     <p:spTree>
@@ -11282,6 +11950,12 @@
               <a:t>Desafios</a:t>
             </a:r>
           </a:p>
+          <a:p>
+            <a:r>
+              <a:rPr lang="pt-BR" dirty="0"/>
+              <a:t>Qual é o limite?</a:t>
+            </a:r>
+          </a:p>
         </p:txBody>
       </p:sp>
       <p:sp>
@@ -11455,51 +12129,6 @@
       </p:pic>
       <p:sp>
         <p:nvSpPr>
-          <p:cNvPr id="6" name="CaixaDeTexto 5">
-            <a:extLst>
-              <a:ext uri="{FF2B5EF4-FFF2-40B4-BE49-F238E27FC236}">
-                <a16:creationId xmlns:a16="http://schemas.microsoft.com/office/drawing/2014/main" id="{6D41838B-6B0E-4554-9D0D-35EC5E69073B}"/>
-              </a:ext>
-            </a:extLst>
-          </p:cNvPr>
-          <p:cNvSpPr txBox="1"/>
-          <p:nvPr/>
-        </p:nvSpPr>
-        <p:spPr>
-          <a:xfrm>
-            <a:off x="6851178" y="6581001"/>
-            <a:ext cx="5413598" cy="276999"/>
-          </a:xfrm>
-          <a:prstGeom prst="rect">
-            <a:avLst/>
-          </a:prstGeom>
-          <a:noFill/>
-        </p:spPr>
-        <p:txBody>
-          <a:bodyPr wrap="none" rtlCol="0">
-            <a:spAutoFit/>
-          </a:bodyPr>
-          <a:lstStyle/>
-          <a:p>
-            <a:r>
-              <a:rPr lang="pt-BR" sz="1200" dirty="0"/>
-              <a:t>Fonte: </a:t>
-            </a:r>
-            <a:r>
-              <a:rPr lang="pt-BR" sz="1200" dirty="0">
-                <a:hlinkClick r:id="rId3"/>
-              </a:rPr>
-              <a:t>https://towardsdatascience.com/data-science-interview-guide-4ee9f5dc778</a:t>
-            </a:r>
-            <a:r>
-              <a:rPr lang="pt-BR" sz="1200" dirty="0"/>
-              <a:t> </a:t>
-            </a:r>
-          </a:p>
-        </p:txBody>
-      </p:sp>
-      <p:sp>
-        <p:nvSpPr>
           <p:cNvPr id="7" name="Espaço Reservado para Número de Slide 6">
             <a:extLst>
               <a:ext uri="{FF2B5EF4-FFF2-40B4-BE49-F238E27FC236}">
@@ -11654,6 +12283,53 @@
           </a:p>
         </p:txBody>
       </p:sp>
+      <p:pic>
+        <p:nvPicPr>
+          <p:cNvPr id="1026" name="Picture 2" descr="Uma visão geral sobre programação · Lógica de Programação em C">
+            <a:extLst>
+              <a:ext uri="{FF2B5EF4-FFF2-40B4-BE49-F238E27FC236}">
+                <a16:creationId xmlns:a16="http://schemas.microsoft.com/office/drawing/2014/main" id="{B32D52E9-D257-4C66-B5DC-3BF7DAFCF6A7}"/>
+              </a:ext>
+            </a:extLst>
+          </p:cNvPr>
+          <p:cNvPicPr>
+            <a:picLocks noChangeAspect="1" noChangeArrowheads="1"/>
+          </p:cNvPicPr>
+          <p:nvPr/>
+        </p:nvPicPr>
+        <p:blipFill>
+          <a:blip r:embed="rId2">
+            <a:extLst>
+              <a:ext uri="{28A0092B-C50C-407E-A947-70E740481C1C}">
+                <a14:useLocalDpi xmlns:a14="http://schemas.microsoft.com/office/drawing/2010/main" val="0"/>
+              </a:ext>
+            </a:extLst>
+          </a:blip>
+          <a:srcRect/>
+          <a:stretch>
+            <a:fillRect/>
+          </a:stretch>
+        </p:blipFill>
+        <p:spPr bwMode="auto">
+          <a:xfrm>
+            <a:off x="3809695" y="4400290"/>
+            <a:ext cx="4572609" cy="1956060"/>
+          </a:xfrm>
+          <a:prstGeom prst="rect">
+            <a:avLst/>
+          </a:prstGeom>
+          <a:noFill/>
+          <a:extLst>
+            <a:ext uri="{909E8E84-426E-40DD-AFC4-6F175D3DCCD1}">
+              <a14:hiddenFill xmlns:a14="http://schemas.microsoft.com/office/drawing/2010/main">
+                <a:solidFill>
+                  <a:srgbClr val="FFFFFF"/>
+                </a:solidFill>
+              </a14:hiddenFill>
+            </a:ext>
+          </a:extLst>
+        </p:spPr>
+      </p:pic>
     </p:spTree>
     <p:extLst>
       <p:ext uri="{BB962C8B-B14F-4D97-AF65-F5344CB8AC3E}">
@@ -12420,51 +13096,6 @@
           </a:extLst>
         </p:spPr>
       </p:pic>
-      <p:sp>
-        <p:nvSpPr>
-          <p:cNvPr id="5" name="CaixaDeTexto 4">
-            <a:extLst>
-              <a:ext uri="{FF2B5EF4-FFF2-40B4-BE49-F238E27FC236}">
-                <a16:creationId xmlns:a16="http://schemas.microsoft.com/office/drawing/2014/main" id="{F017390C-4F0B-4F55-9050-F6AE24649C49}"/>
-              </a:ext>
-            </a:extLst>
-          </p:cNvPr>
-          <p:cNvSpPr txBox="1"/>
-          <p:nvPr/>
-        </p:nvSpPr>
-        <p:spPr>
-          <a:xfrm>
-            <a:off x="6621653" y="6581001"/>
-            <a:ext cx="5598520" cy="276999"/>
-          </a:xfrm>
-          <a:prstGeom prst="rect">
-            <a:avLst/>
-          </a:prstGeom>
-          <a:noFill/>
-        </p:spPr>
-        <p:txBody>
-          <a:bodyPr wrap="none" rtlCol="0">
-            <a:spAutoFit/>
-          </a:bodyPr>
-          <a:lstStyle/>
-          <a:p>
-            <a:r>
-              <a:rPr lang="pt-BR" sz="1200" dirty="0"/>
-              <a:t>Fonte: </a:t>
-            </a:r>
-            <a:r>
-              <a:rPr lang="pt-BR" sz="1200" dirty="0">
-                <a:hlinkClick r:id="rId3"/>
-              </a:rPr>
-              <a:t>https://www.fiverr.com/vision_ai/do-machine-learning-and-deep-learning-tasks</a:t>
-            </a:r>
-            <a:r>
-              <a:rPr lang="pt-BR" sz="1200" dirty="0"/>
-              <a:t> </a:t>
-            </a:r>
-          </a:p>
-        </p:txBody>
-      </p:sp>
     </p:spTree>
     <p:extLst>
       <p:ext uri="{BB962C8B-B14F-4D97-AF65-F5344CB8AC3E}">
@@ -12744,8 +13375,68 @@
         </p:blipFill>
         <p:spPr>
           <a:xfrm>
-            <a:off x="2572430" y="1219199"/>
+            <a:off x="2572430" y="1177254"/>
             <a:ext cx="7047140" cy="4820053"/>
+          </a:xfrm>
+          <a:prstGeom prst="rect">
+            <a:avLst/>
+          </a:prstGeom>
+        </p:spPr>
+      </p:pic>
+      <p:pic>
+        <p:nvPicPr>
+          <p:cNvPr id="9" name="Imagem 8">
+            <a:extLst>
+              <a:ext uri="{FF2B5EF4-FFF2-40B4-BE49-F238E27FC236}">
+                <a16:creationId xmlns:a16="http://schemas.microsoft.com/office/drawing/2014/main" id="{9384C78D-2440-46B1-B8BD-C1863D6BB153}"/>
+              </a:ext>
+            </a:extLst>
+          </p:cNvPr>
+          <p:cNvPicPr>
+            <a:picLocks noChangeAspect="1"/>
+          </p:cNvPicPr>
+          <p:nvPr/>
+        </p:nvPicPr>
+        <p:blipFill>
+          <a:blip r:embed="rId3"/>
+          <a:stretch>
+            <a:fillRect/>
+          </a:stretch>
+        </p:blipFill>
+        <p:spPr>
+          <a:xfrm>
+            <a:off x="6403975" y="1789314"/>
+            <a:ext cx="414383" cy="180928"/>
+          </a:xfrm>
+          <a:prstGeom prst="rect">
+            <a:avLst/>
+          </a:prstGeom>
+        </p:spPr>
+      </p:pic>
+      <p:pic>
+        <p:nvPicPr>
+          <p:cNvPr id="11" name="Imagem 10">
+            <a:extLst>
+              <a:ext uri="{FF2B5EF4-FFF2-40B4-BE49-F238E27FC236}">
+                <a16:creationId xmlns:a16="http://schemas.microsoft.com/office/drawing/2014/main" id="{98A990EB-8805-40E7-9D3C-2AA0C2CF5D15}"/>
+              </a:ext>
+            </a:extLst>
+          </p:cNvPr>
+          <p:cNvPicPr>
+            <a:picLocks noChangeAspect="1"/>
+          </p:cNvPicPr>
+          <p:nvPr/>
+        </p:nvPicPr>
+        <p:blipFill>
+          <a:blip r:embed="rId4"/>
+          <a:stretch>
+            <a:fillRect/>
+          </a:stretch>
+        </p:blipFill>
+        <p:spPr>
+          <a:xfrm>
+            <a:off x="6818358" y="1790700"/>
+            <a:ext cx="243317" cy="180928"/>
           </a:xfrm>
           <a:prstGeom prst="rect">
             <a:avLst/>
@@ -13262,9 +13953,12 @@
 </file>
 
 <file path=customXml/item1.xml><?xml version="1.0" encoding="utf-8"?>
-<p:properties xmlns:p="http://schemas.microsoft.com/office/2006/metadata/properties" xmlns:xsi="http://www.w3.org/2001/XMLSchema-instance" xmlns:pc="http://schemas.microsoft.com/office/infopath/2007/PartnerControls">
-  <documentManagement/>
-</p:properties>
+<?mso-contentType ?>
+<FormTemplates xmlns="http://schemas.microsoft.com/sharepoint/v3/contenttype/forms">
+  <Display>DocumentLibraryForm</Display>
+  <Edit>DocumentLibraryForm</Edit>
+  <New>DocumentLibraryForm</New>
+</FormTemplates>
 </file>
 
 <file path=customXml/item2.xml><?xml version="1.0" encoding="utf-8"?>
@@ -13485,19 +14179,15 @@
 </file>
 
 <file path=customXml/item3.xml><?xml version="1.0" encoding="utf-8"?>
-<?mso-contentType ?>
-<FormTemplates xmlns="http://schemas.microsoft.com/sharepoint/v3/contenttype/forms">
-  <Display>DocumentLibraryForm</Display>
-  <Edit>DocumentLibraryForm</Edit>
-  <New>DocumentLibraryForm</New>
-</FormTemplates>
+<p:properties xmlns:p="http://schemas.microsoft.com/office/2006/metadata/properties" xmlns:xsi="http://www.w3.org/2001/XMLSchema-instance" xmlns:pc="http://schemas.microsoft.com/office/infopath/2007/PartnerControls">
+  <documentManagement/>
+</p:properties>
 </file>
 
 <file path=customXml/itemProps1.xml><?xml version="1.0" encoding="utf-8"?>
-<ds:datastoreItem xmlns:ds="http://schemas.openxmlformats.org/officeDocument/2006/customXml" ds:itemID="{4D682653-5626-4954-B069-D5AFB03516DA}">
+<ds:datastoreItem xmlns:ds="http://schemas.openxmlformats.org/officeDocument/2006/customXml" ds:itemID="{87F0DBD6-2588-4862-BF6A-F4BDB35F5043}">
   <ds:schemaRefs>
-    <ds:schemaRef ds:uri="http://schemas.microsoft.com/office/2006/metadata/properties"/>
-    <ds:schemaRef ds:uri="http://schemas.microsoft.com/office/infopath/2007/PartnerControls"/>
+    <ds:schemaRef ds:uri="http://schemas.microsoft.com/sharepoint/v3/contenttype/forms"/>
   </ds:schemaRefs>
 </ds:datastoreItem>
 </file>
@@ -13522,9 +14212,10 @@
 </file>
 
 <file path=customXml/itemProps3.xml><?xml version="1.0" encoding="utf-8"?>
-<ds:datastoreItem xmlns:ds="http://schemas.openxmlformats.org/officeDocument/2006/customXml" ds:itemID="{87F0DBD6-2588-4862-BF6A-F4BDB35F5043}">
+<ds:datastoreItem xmlns:ds="http://schemas.openxmlformats.org/officeDocument/2006/customXml" ds:itemID="{4D682653-5626-4954-B069-D5AFB03516DA}">
   <ds:schemaRefs>
-    <ds:schemaRef ds:uri="http://schemas.microsoft.com/sharepoint/v3/contenttype/forms"/>
+    <ds:schemaRef ds:uri="http://schemas.microsoft.com/office/2006/metadata/properties"/>
+    <ds:schemaRef ds:uri="http://schemas.microsoft.com/office/infopath/2007/PartnerControls"/>
   </ds:schemaRefs>
 </ds:datastoreItem>
 </file>
</xml_diff>